<commit_message>
update det_matrix and mul_matrix
</commit_message>
<xml_diff>
--- a/lab4/Lab 04 - 陣列與字串.pptx
+++ b/lab4/Lab 04 - 陣列與字串.pptx
@@ -1,37 +1,37 @@
 
 <file path=ppt/presentation.xml><?xml version="1.0" encoding="utf-8"?>
-<p:presentation xmlns:a="http://schemas.openxmlformats.org/drawingml/2006/main" xmlns:r="http://schemas.openxmlformats.org/officeDocument/2006/relationships" xmlns:mc="http://schemas.openxmlformats.org/markup-compatibility/2006" xmlns:mv="urn:schemas-microsoft-com:mac:vml" xmlns:p="http://schemas.openxmlformats.org/presentationml/2006/main" xmlns:c="http://schemas.openxmlformats.org/drawingml/2006/chart" xmlns:dgm="http://schemas.openxmlformats.org/drawingml/2006/diagram" xmlns:o="urn:schemas-microsoft-com:office:office" xmlns:v="urn:schemas-microsoft-com:vml" xmlns:pvml="urn:schemas-microsoft-com:office:powerpoint" xmlns:com="http://schemas.openxmlformats.org/drawingml/2006/compatibility" xmlns:p14="http://schemas.microsoft.com/office/powerpoint/2010/main" autoCompressPictures="0" embedTrueTypeFonts="1" strictFirstAndLastChars="0" saveSubsetFonts="1">
+<p:presentation xmlns:a="http://schemas.openxmlformats.org/drawingml/2006/main" xmlns:r="http://schemas.openxmlformats.org/officeDocument/2006/relationships" xmlns:p="http://schemas.openxmlformats.org/presentationml/2006/main" strictFirstAndLastChars="0" embedTrueTypeFonts="1" saveSubsetFonts="1" autoCompressPictures="0">
   <p:sldMasterIdLst>
-    <p:sldMasterId id="2147483659" r:id="rId3"/>
+    <p:sldMasterId id="2147483659" r:id="rId1"/>
   </p:sldMasterIdLst>
   <p:notesMasterIdLst>
-    <p:notesMasterId r:id="rId4"/>
+    <p:notesMasterId r:id="rId7"/>
   </p:notesMasterIdLst>
   <p:sldIdLst>
-    <p:sldId id="256" r:id="rId5"/>
-    <p:sldId id="257" r:id="rId6"/>
-    <p:sldId id="258" r:id="rId7"/>
-    <p:sldId id="259" r:id="rId8"/>
-    <p:sldId id="260" r:id="rId9"/>
+    <p:sldId id="256" r:id="rId2"/>
+    <p:sldId id="257" r:id="rId3"/>
+    <p:sldId id="258" r:id="rId4"/>
+    <p:sldId id="259" r:id="rId5"/>
+    <p:sldId id="260" r:id="rId6"/>
   </p:sldIdLst>
-  <p:sldSz cy="5143500" cx="9144000"/>
+  <p:sldSz cx="9144000" cy="5143500" type="screen16x9"/>
   <p:notesSz cx="6858000" cy="9144000"/>
   <p:embeddedFontLst>
     <p:embeddedFont>
-      <p:font typeface="Roboto Slab"/>
-      <p:regular r:id="rId10"/>
-      <p:bold r:id="rId11"/>
+      <p:font typeface="Roboto" panose="02020500000000000000" charset="0"/>
+      <p:regular r:id="rId8"/>
+      <p:bold r:id="rId9"/>
+      <p:italic r:id="rId10"/>
+      <p:boldItalic r:id="rId11"/>
     </p:embeddedFont>
     <p:embeddedFont>
-      <p:font typeface="Roboto"/>
+      <p:font typeface="Roboto Slab" panose="02020500000000000000" charset="0"/>
       <p:regular r:id="rId12"/>
       <p:bold r:id="rId13"/>
-      <p:italic r:id="rId14"/>
-      <p:boldItalic r:id="rId15"/>
     </p:embeddedFont>
   </p:embeddedFontLst>
   <p:defaultTextStyle>
-    <a:defPPr lvl="0" marR="0" rtl="0" algn="l">
+    <a:defPPr marR="0" lvl="0" algn="l" rtl="0">
       <a:lnSpc>
         <a:spcPct val="100000"/>
       </a:lnSpc>
@@ -42,7 +42,7 @@
         <a:spcPts val="0"/>
       </a:spcAft>
     </a:defPPr>
-    <a:lvl1pPr lvl="0" marR="0" rtl="0" algn="l">
+    <a:lvl1pPr marR="0" lvl="0" algn="l" rtl="0">
       <a:lnSpc>
         <a:spcPct val="100000"/>
       </a:lnSpc>
@@ -53,7 +53,7 @@
         <a:spcPts val="0"/>
       </a:spcAft>
       <a:buNone/>
-      <a:defRPr b="0" i="0" sz="1400" u="none" cap="none" strike="noStrike">
+      <a:defRPr sz="1400" b="0" i="0" u="none" strike="noStrike" cap="none">
         <a:solidFill>
           <a:srgbClr val="000000"/>
         </a:solidFill>
@@ -63,7 +63,7 @@
         <a:sym typeface="Arial"/>
       </a:defRPr>
     </a:lvl1pPr>
-    <a:lvl2pPr lvl="1" marR="0" rtl="0" algn="l">
+    <a:lvl2pPr marR="0" lvl="1" algn="l" rtl="0">
       <a:lnSpc>
         <a:spcPct val="100000"/>
       </a:lnSpc>
@@ -74,7 +74,7 @@
         <a:spcPts val="0"/>
       </a:spcAft>
       <a:buNone/>
-      <a:defRPr b="0" i="0" sz="1400" u="none" cap="none" strike="noStrike">
+      <a:defRPr sz="1400" b="0" i="0" u="none" strike="noStrike" cap="none">
         <a:solidFill>
           <a:srgbClr val="000000"/>
         </a:solidFill>
@@ -84,7 +84,7 @@
         <a:sym typeface="Arial"/>
       </a:defRPr>
     </a:lvl2pPr>
-    <a:lvl3pPr lvl="2" marR="0" rtl="0" algn="l">
+    <a:lvl3pPr marR="0" lvl="2" algn="l" rtl="0">
       <a:lnSpc>
         <a:spcPct val="100000"/>
       </a:lnSpc>
@@ -95,7 +95,7 @@
         <a:spcPts val="0"/>
       </a:spcAft>
       <a:buNone/>
-      <a:defRPr b="0" i="0" sz="1400" u="none" cap="none" strike="noStrike">
+      <a:defRPr sz="1400" b="0" i="0" u="none" strike="noStrike" cap="none">
         <a:solidFill>
           <a:srgbClr val="000000"/>
         </a:solidFill>
@@ -105,7 +105,7 @@
         <a:sym typeface="Arial"/>
       </a:defRPr>
     </a:lvl3pPr>
-    <a:lvl4pPr lvl="3" marR="0" rtl="0" algn="l">
+    <a:lvl4pPr marR="0" lvl="3" algn="l" rtl="0">
       <a:lnSpc>
         <a:spcPct val="100000"/>
       </a:lnSpc>
@@ -116,7 +116,7 @@
         <a:spcPts val="0"/>
       </a:spcAft>
       <a:buNone/>
-      <a:defRPr b="0" i="0" sz="1400" u="none" cap="none" strike="noStrike">
+      <a:defRPr sz="1400" b="0" i="0" u="none" strike="noStrike" cap="none">
         <a:solidFill>
           <a:srgbClr val="000000"/>
         </a:solidFill>
@@ -126,7 +126,7 @@
         <a:sym typeface="Arial"/>
       </a:defRPr>
     </a:lvl4pPr>
-    <a:lvl5pPr lvl="4" marR="0" rtl="0" algn="l">
+    <a:lvl5pPr marR="0" lvl="4" algn="l" rtl="0">
       <a:lnSpc>
         <a:spcPct val="100000"/>
       </a:lnSpc>
@@ -137,7 +137,7 @@
         <a:spcPts val="0"/>
       </a:spcAft>
       <a:buNone/>
-      <a:defRPr b="0" i="0" sz="1400" u="none" cap="none" strike="noStrike">
+      <a:defRPr sz="1400" b="0" i="0" u="none" strike="noStrike" cap="none">
         <a:solidFill>
           <a:srgbClr val="000000"/>
         </a:solidFill>
@@ -147,7 +147,7 @@
         <a:sym typeface="Arial"/>
       </a:defRPr>
     </a:lvl5pPr>
-    <a:lvl6pPr lvl="5" marR="0" rtl="0" algn="l">
+    <a:lvl6pPr marR="0" lvl="5" algn="l" rtl="0">
       <a:lnSpc>
         <a:spcPct val="100000"/>
       </a:lnSpc>
@@ -158,7 +158,7 @@
         <a:spcPts val="0"/>
       </a:spcAft>
       <a:buNone/>
-      <a:defRPr b="0" i="0" sz="1400" u="none" cap="none" strike="noStrike">
+      <a:defRPr sz="1400" b="0" i="0" u="none" strike="noStrike" cap="none">
         <a:solidFill>
           <a:srgbClr val="000000"/>
         </a:solidFill>
@@ -168,7 +168,7 @@
         <a:sym typeface="Arial"/>
       </a:defRPr>
     </a:lvl6pPr>
-    <a:lvl7pPr lvl="6" marR="0" rtl="0" algn="l">
+    <a:lvl7pPr marR="0" lvl="6" algn="l" rtl="0">
       <a:lnSpc>
         <a:spcPct val="100000"/>
       </a:lnSpc>
@@ -179,7 +179,7 @@
         <a:spcPts val="0"/>
       </a:spcAft>
       <a:buNone/>
-      <a:defRPr b="0" i="0" sz="1400" u="none" cap="none" strike="noStrike">
+      <a:defRPr sz="1400" b="0" i="0" u="none" strike="noStrike" cap="none">
         <a:solidFill>
           <a:srgbClr val="000000"/>
         </a:solidFill>
@@ -189,7 +189,7 @@
         <a:sym typeface="Arial"/>
       </a:defRPr>
     </a:lvl7pPr>
-    <a:lvl8pPr lvl="7" marR="0" rtl="0" algn="l">
+    <a:lvl8pPr marR="0" lvl="7" algn="l" rtl="0">
       <a:lnSpc>
         <a:spcPct val="100000"/>
       </a:lnSpc>
@@ -200,7 +200,7 @@
         <a:spcPts val="0"/>
       </a:spcAft>
       <a:buNone/>
-      <a:defRPr b="0" i="0" sz="1400" u="none" cap="none" strike="noStrike">
+      <a:defRPr sz="1400" b="0" i="0" u="none" strike="noStrike" cap="none">
         <a:solidFill>
           <a:srgbClr val="000000"/>
         </a:solidFill>
@@ -210,7 +210,7 @@
         <a:sym typeface="Arial"/>
       </a:defRPr>
     </a:lvl8pPr>
-    <a:lvl9pPr lvl="8" marR="0" rtl="0" algn="l">
+    <a:lvl9pPr marR="0" lvl="8" algn="l" rtl="0">
       <a:lnSpc>
         <a:spcPct val="100000"/>
       </a:lnSpc>
@@ -221,7 +221,7 @@
         <a:spcPts val="0"/>
       </a:spcAft>
       <a:buNone/>
-      <a:defRPr b="0" i="0" sz="1400" u="none" cap="none" strike="noStrike">
+      <a:defRPr sz="1400" b="0" i="0" u="none" strike="noStrike" cap="none">
         <a:solidFill>
           <a:srgbClr val="000000"/>
         </a:solidFill>
@@ -236,11 +236,16 @@
 </file>
 
 <file path=ppt/notesMasters/notesMaster1.xml><?xml version="1.0" encoding="utf-8"?>
-<p:notesMaster xmlns:a="http://schemas.openxmlformats.org/drawingml/2006/main" xmlns:r="http://schemas.openxmlformats.org/officeDocument/2006/relationships" xmlns:mc="http://schemas.openxmlformats.org/markup-compatibility/2006" xmlns:mv="urn:schemas-microsoft-com:mac:vml" xmlns:p="http://schemas.openxmlformats.org/presentationml/2006/main" xmlns:c="http://schemas.openxmlformats.org/drawingml/2006/chart" xmlns:dgm="http://schemas.openxmlformats.org/drawingml/2006/diagram" xmlns:o="urn:schemas-microsoft-com:office:office" xmlns:v="urn:schemas-microsoft-com:vml" xmlns:pvml="urn:schemas-microsoft-com:office:powerpoint" xmlns:com="http://schemas.openxmlformats.org/drawingml/2006/compatibility" xmlns:p14="http://schemas.microsoft.com/office/powerpoint/2010/main">
+<p:notesMaster xmlns:a="http://schemas.openxmlformats.org/drawingml/2006/main" xmlns:r="http://schemas.openxmlformats.org/officeDocument/2006/relationships" xmlns:p="http://schemas.openxmlformats.org/presentationml/2006/main">
   <p:cSld>
+    <p:bg>
+      <p:bgRef idx="1001">
+        <a:schemeClr val="bg1"/>
+      </p:bgRef>
+    </p:bg>
     <p:spTree>
       <p:nvGrpSpPr>
-        <p:cNvPr id="2" name="Shape 2"/>
+        <p:cNvPr id="1" name="Shape 2"/>
         <p:cNvGrpSpPr/>
         <p:nvPr/>
       </p:nvGrpSpPr>
@@ -255,9 +260,11 @@
       <p:sp>
         <p:nvSpPr>
           <p:cNvPr id="3" name="Shape 3"/>
-          <p:cNvSpPr/>
+          <p:cNvSpPr>
+            <a:spLocks noGrp="1" noRot="1" noChangeAspect="1"/>
+          </p:cNvSpPr>
           <p:nvPr>
-            <p:ph idx="2" type="sldImg"/>
+            <p:ph type="sldImg" idx="2"/>
           </p:nvPr>
         </p:nvSpPr>
         <p:spPr>
@@ -266,8 +273,13 @@
             <a:ext cx="6096075" cy="3429000"/>
           </a:xfrm>
           <a:custGeom>
+            <a:avLst/>
+            <a:gdLst/>
+            <a:ahLst/>
+            <a:cxnLst/>
+            <a:rect l="0" t="0" r="0" b="0"/>
             <a:pathLst>
-              <a:path extrusionOk="0" h="120000" w="120000">
+              <a:path w="120000" h="120000" extrusionOk="0">
                 <a:moveTo>
                   <a:pt x="0" y="0"/>
                 </a:moveTo>
@@ -285,23 +297,25 @@
             </a:pathLst>
           </a:custGeom>
           <a:noFill/>
-          <a:ln cap="flat" cmpd="sng" w="9525">
+          <a:ln w="9525" cap="flat" cmpd="sng">
             <a:solidFill>
               <a:srgbClr val="000000"/>
             </a:solidFill>
             <a:prstDash val="solid"/>
             <a:round/>
-            <a:headEnd len="med" w="med" type="none"/>
-            <a:tailEnd len="med" w="med" type="none"/>
+            <a:headEnd type="none" w="med" len="med"/>
+            <a:tailEnd type="none" w="med" len="med"/>
           </a:ln>
         </p:spPr>
       </p:sp>
       <p:sp>
         <p:nvSpPr>
           <p:cNvPr id="4" name="Shape 4"/>
-          <p:cNvSpPr txBox="1"/>
+          <p:cNvSpPr txBox="1">
+            <a:spLocks noGrp="1"/>
+          </p:cNvSpPr>
           <p:nvPr>
-            <p:ph idx="1" type="body"/>
+            <p:ph type="body" idx="1"/>
           </p:nvPr>
         </p:nvSpPr>
         <p:spPr>
@@ -318,7 +332,7 @@
           </a:ln>
         </p:spPr>
         <p:txBody>
-          <a:bodyPr anchorCtr="0" anchor="t" bIns="91425" lIns="91425" rIns="91425" tIns="91425"/>
+          <a:bodyPr lIns="91425" tIns="91425" rIns="91425" bIns="91425" anchor="t" anchorCtr="0"/>
           <a:lstStyle>
             <a:lvl1pPr lvl="0">
               <a:spcBef>
@@ -375,21 +389,115 @@
               <a:defRPr sz="1100"/>
             </a:lvl9pPr>
           </a:lstStyle>
-          <a:p/>
+          <a:p>
+            <a:endParaRPr/>
+          </a:p>
         </p:txBody>
       </p:sp>
     </p:spTree>
   </p:cSld>
-  <p:clrMap accent1="accent1" accent2="accent2" accent3="accent3" accent4="accent4" accent5="accent5" accent6="accent6" bg1="lt1" bg2="dk2" tx1="dk1" tx2="lt2" folHlink="folHlink" hlink="hlink"/>
+  <p:clrMap bg1="lt1" tx1="dk1" bg2="dk2" tx2="lt2" accent1="accent1" accent2="accent2" accent3="accent3" accent4="accent4" accent5="accent5" accent6="accent6" hlink="hlink" folHlink="folHlink"/>
+  <p:notesStyle>
+    <a:lvl1pPr marL="0" algn="l" defTabSz="914400" rtl="0" eaLnBrk="1" latinLnBrk="0" hangingPunct="1">
+      <a:defRPr sz="1200" kern="1200">
+        <a:solidFill>
+          <a:schemeClr val="tx1"/>
+        </a:solidFill>
+        <a:latin typeface="+mn-lt"/>
+        <a:ea typeface="+mn-ea"/>
+        <a:cs typeface="+mn-cs"/>
+      </a:defRPr>
+    </a:lvl1pPr>
+    <a:lvl2pPr marL="457200" algn="l" defTabSz="914400" rtl="0" eaLnBrk="1" latinLnBrk="0" hangingPunct="1">
+      <a:defRPr sz="1200" kern="1200">
+        <a:solidFill>
+          <a:schemeClr val="tx1"/>
+        </a:solidFill>
+        <a:latin typeface="+mn-lt"/>
+        <a:ea typeface="+mn-ea"/>
+        <a:cs typeface="+mn-cs"/>
+      </a:defRPr>
+    </a:lvl2pPr>
+    <a:lvl3pPr marL="914400" algn="l" defTabSz="914400" rtl="0" eaLnBrk="1" latinLnBrk="0" hangingPunct="1">
+      <a:defRPr sz="1200" kern="1200">
+        <a:solidFill>
+          <a:schemeClr val="tx1"/>
+        </a:solidFill>
+        <a:latin typeface="+mn-lt"/>
+        <a:ea typeface="+mn-ea"/>
+        <a:cs typeface="+mn-cs"/>
+      </a:defRPr>
+    </a:lvl3pPr>
+    <a:lvl4pPr marL="1371600" algn="l" defTabSz="914400" rtl="0" eaLnBrk="1" latinLnBrk="0" hangingPunct="1">
+      <a:defRPr sz="1200" kern="1200">
+        <a:solidFill>
+          <a:schemeClr val="tx1"/>
+        </a:solidFill>
+        <a:latin typeface="+mn-lt"/>
+        <a:ea typeface="+mn-ea"/>
+        <a:cs typeface="+mn-cs"/>
+      </a:defRPr>
+    </a:lvl4pPr>
+    <a:lvl5pPr marL="1828800" algn="l" defTabSz="914400" rtl="0" eaLnBrk="1" latinLnBrk="0" hangingPunct="1">
+      <a:defRPr sz="1200" kern="1200">
+        <a:solidFill>
+          <a:schemeClr val="tx1"/>
+        </a:solidFill>
+        <a:latin typeface="+mn-lt"/>
+        <a:ea typeface="+mn-ea"/>
+        <a:cs typeface="+mn-cs"/>
+      </a:defRPr>
+    </a:lvl5pPr>
+    <a:lvl6pPr marL="2286000" algn="l" defTabSz="914400" rtl="0" eaLnBrk="1" latinLnBrk="0" hangingPunct="1">
+      <a:defRPr sz="1200" kern="1200">
+        <a:solidFill>
+          <a:schemeClr val="tx1"/>
+        </a:solidFill>
+        <a:latin typeface="+mn-lt"/>
+        <a:ea typeface="+mn-ea"/>
+        <a:cs typeface="+mn-cs"/>
+      </a:defRPr>
+    </a:lvl6pPr>
+    <a:lvl7pPr marL="2743200" algn="l" defTabSz="914400" rtl="0" eaLnBrk="1" latinLnBrk="0" hangingPunct="1">
+      <a:defRPr sz="1200" kern="1200">
+        <a:solidFill>
+          <a:schemeClr val="tx1"/>
+        </a:solidFill>
+        <a:latin typeface="+mn-lt"/>
+        <a:ea typeface="+mn-ea"/>
+        <a:cs typeface="+mn-cs"/>
+      </a:defRPr>
+    </a:lvl7pPr>
+    <a:lvl8pPr marL="3200400" algn="l" defTabSz="914400" rtl="0" eaLnBrk="1" latinLnBrk="0" hangingPunct="1">
+      <a:defRPr sz="1200" kern="1200">
+        <a:solidFill>
+          <a:schemeClr val="tx1"/>
+        </a:solidFill>
+        <a:latin typeface="+mn-lt"/>
+        <a:ea typeface="+mn-ea"/>
+        <a:cs typeface="+mn-cs"/>
+      </a:defRPr>
+    </a:lvl8pPr>
+    <a:lvl9pPr marL="3657600" algn="l" defTabSz="914400" rtl="0" eaLnBrk="1" latinLnBrk="0" hangingPunct="1">
+      <a:defRPr sz="1200" kern="1200">
+        <a:solidFill>
+          <a:schemeClr val="tx1"/>
+        </a:solidFill>
+        <a:latin typeface="+mn-lt"/>
+        <a:ea typeface="+mn-ea"/>
+        <a:cs typeface="+mn-cs"/>
+      </a:defRPr>
+    </a:lvl9pPr>
+  </p:notesStyle>
 </p:notesMaster>
 </file>
 
 <file path=ppt/notesSlides/notesSlide1.xml><?xml version="1.0" encoding="utf-8"?>
-<p:notes xmlns:a="http://schemas.openxmlformats.org/drawingml/2006/main" xmlns:r="http://schemas.openxmlformats.org/officeDocument/2006/relationships" xmlns:mc="http://schemas.openxmlformats.org/markup-compatibility/2006" xmlns:mv="urn:schemas-microsoft-com:mac:vml" xmlns:p="http://schemas.openxmlformats.org/presentationml/2006/main" xmlns:c="http://schemas.openxmlformats.org/drawingml/2006/chart" xmlns:dgm="http://schemas.openxmlformats.org/drawingml/2006/diagram" xmlns:o="urn:schemas-microsoft-com:office:office" xmlns:v="urn:schemas-microsoft-com:vml" xmlns:pvml="urn:schemas-microsoft-com:office:powerpoint" xmlns:com="http://schemas.openxmlformats.org/drawingml/2006/compatibility" xmlns:p14="http://schemas.microsoft.com/office/powerpoint/2010/main" showMasterPhAnim="0" showMasterSp="0">
+<p:notes xmlns:a="http://schemas.openxmlformats.org/drawingml/2006/main" xmlns:r="http://schemas.openxmlformats.org/officeDocument/2006/relationships" xmlns:p="http://schemas.openxmlformats.org/presentationml/2006/main" showMasterSp="0" showMasterPhAnim="0">
   <p:cSld>
     <p:spTree>
       <p:nvGrpSpPr>
-        <p:cNvPr id="59" name="Shape 59"/>
+        <p:cNvPr id="1" name="Shape 59"/>
         <p:cNvGrpSpPr/>
         <p:nvPr/>
       </p:nvGrpSpPr>
@@ -404,9 +512,11 @@
       <p:sp>
         <p:nvSpPr>
           <p:cNvPr id="60" name="Shape 60"/>
-          <p:cNvSpPr/>
+          <p:cNvSpPr>
+            <a:spLocks noGrp="1" noRot="1" noChangeAspect="1"/>
+          </p:cNvSpPr>
           <p:nvPr>
-            <p:ph idx="2" type="sldImg"/>
+            <p:ph type="sldImg" idx="2"/>
           </p:nvPr>
         </p:nvSpPr>
         <p:spPr>
@@ -415,8 +525,13 @@
             <a:ext cx="6096075" cy="3429000"/>
           </a:xfrm>
           <a:custGeom>
+            <a:avLst/>
+            <a:gdLst/>
+            <a:ahLst/>
+            <a:cxnLst/>
+            <a:rect l="0" t="0" r="0" b="0"/>
             <a:pathLst>
-              <a:path extrusionOk="0" h="120000" w="120000">
+              <a:path w="120000" h="120000" extrusionOk="0">
                 <a:moveTo>
                   <a:pt x="0" y="0"/>
                 </a:moveTo>
@@ -438,9 +553,11 @@
       <p:sp>
         <p:nvSpPr>
           <p:cNvPr id="61" name="Shape 61"/>
-          <p:cNvSpPr txBox="1"/>
+          <p:cNvSpPr txBox="1">
+            <a:spLocks noGrp="1"/>
+          </p:cNvSpPr>
           <p:nvPr>
-            <p:ph idx="1" type="body"/>
+            <p:ph type="body" idx="1"/>
           </p:nvPr>
         </p:nvSpPr>
         <p:spPr>
@@ -453,7 +570,7 @@
           </a:prstGeom>
         </p:spPr>
         <p:txBody>
-          <a:bodyPr anchorCtr="0" anchor="t" bIns="91425" lIns="91425" rIns="91425" tIns="91425">
+          <a:bodyPr lIns="91425" tIns="91425" rIns="91425" bIns="91425" anchor="t" anchorCtr="0">
             <a:noAutofit/>
           </a:bodyPr>
           <a:lstStyle/>
@@ -464,9 +581,6 @@
               </a:spcBef>
               <a:buNone/>
             </a:pPr>
-            <a:r>
-              <a:t/>
-            </a:r>
             <a:endParaRPr/>
           </a:p>
         </p:txBody>
@@ -480,11 +594,11 @@
 </file>
 
 <file path=ppt/notesSlides/notesSlide2.xml><?xml version="1.0" encoding="utf-8"?>
-<p:notes xmlns:a="http://schemas.openxmlformats.org/drawingml/2006/main" xmlns:r="http://schemas.openxmlformats.org/officeDocument/2006/relationships" xmlns:mc="http://schemas.openxmlformats.org/markup-compatibility/2006" xmlns:mv="urn:schemas-microsoft-com:mac:vml" xmlns:p="http://schemas.openxmlformats.org/presentationml/2006/main" xmlns:c="http://schemas.openxmlformats.org/drawingml/2006/chart" xmlns:dgm="http://schemas.openxmlformats.org/drawingml/2006/diagram" xmlns:o="urn:schemas-microsoft-com:office:office" xmlns:v="urn:schemas-microsoft-com:vml" xmlns:pvml="urn:schemas-microsoft-com:office:powerpoint" xmlns:com="http://schemas.openxmlformats.org/drawingml/2006/compatibility" xmlns:p14="http://schemas.microsoft.com/office/powerpoint/2010/main" showMasterPhAnim="0" showMasterSp="0">
+<p:notes xmlns:a="http://schemas.openxmlformats.org/drawingml/2006/main" xmlns:r="http://schemas.openxmlformats.org/officeDocument/2006/relationships" xmlns:p="http://schemas.openxmlformats.org/presentationml/2006/main" showMasterSp="0" showMasterPhAnim="0">
   <p:cSld>
     <p:spTree>
       <p:nvGrpSpPr>
-        <p:cNvPr id="67" name="Shape 67"/>
+        <p:cNvPr id="1" name="Shape 67"/>
         <p:cNvGrpSpPr/>
         <p:nvPr/>
       </p:nvGrpSpPr>
@@ -499,9 +613,11 @@
       <p:sp>
         <p:nvSpPr>
           <p:cNvPr id="68" name="Shape 68"/>
-          <p:cNvSpPr/>
+          <p:cNvSpPr>
+            <a:spLocks noGrp="1" noRot="1" noChangeAspect="1"/>
+          </p:cNvSpPr>
           <p:nvPr>
-            <p:ph idx="2" type="sldImg"/>
+            <p:ph type="sldImg" idx="2"/>
           </p:nvPr>
         </p:nvSpPr>
         <p:spPr>
@@ -510,8 +626,13 @@
             <a:ext cx="6096000" cy="3429000"/>
           </a:xfrm>
           <a:custGeom>
+            <a:avLst/>
+            <a:gdLst/>
+            <a:ahLst/>
+            <a:cxnLst/>
+            <a:rect l="0" t="0" r="0" b="0"/>
             <a:pathLst>
-              <a:path extrusionOk="0" h="120000" w="120000">
+              <a:path w="120000" h="120000" extrusionOk="0">
                 <a:moveTo>
                   <a:pt x="0" y="0"/>
                 </a:moveTo>
@@ -533,9 +654,11 @@
       <p:sp>
         <p:nvSpPr>
           <p:cNvPr id="69" name="Shape 69"/>
-          <p:cNvSpPr txBox="1"/>
+          <p:cNvSpPr txBox="1">
+            <a:spLocks noGrp="1"/>
+          </p:cNvSpPr>
           <p:nvPr>
-            <p:ph idx="1" type="body"/>
+            <p:ph type="body" idx="1"/>
           </p:nvPr>
         </p:nvSpPr>
         <p:spPr>
@@ -548,7 +671,7 @@
           </a:prstGeom>
         </p:spPr>
         <p:txBody>
-          <a:bodyPr anchorCtr="0" anchor="t" bIns="91425" lIns="91425" rIns="91425" tIns="91425">
+          <a:bodyPr lIns="91425" tIns="91425" rIns="91425" bIns="91425" anchor="t" anchorCtr="0">
             <a:noAutofit/>
           </a:bodyPr>
           <a:lstStyle/>
@@ -559,9 +682,6 @@
               </a:spcBef>
               <a:buNone/>
             </a:pPr>
-            <a:r>
-              <a:t/>
-            </a:r>
             <a:endParaRPr/>
           </a:p>
         </p:txBody>
@@ -575,11 +695,11 @@
 </file>
 
 <file path=ppt/notesSlides/notesSlide3.xml><?xml version="1.0" encoding="utf-8"?>
-<p:notes xmlns:a="http://schemas.openxmlformats.org/drawingml/2006/main" xmlns:r="http://schemas.openxmlformats.org/officeDocument/2006/relationships" xmlns:mc="http://schemas.openxmlformats.org/markup-compatibility/2006" xmlns:mv="urn:schemas-microsoft-com:mac:vml" xmlns:p="http://schemas.openxmlformats.org/presentationml/2006/main" xmlns:c="http://schemas.openxmlformats.org/drawingml/2006/chart" xmlns:dgm="http://schemas.openxmlformats.org/drawingml/2006/diagram" xmlns:o="urn:schemas-microsoft-com:office:office" xmlns:v="urn:schemas-microsoft-com:vml" xmlns:pvml="urn:schemas-microsoft-com:office:powerpoint" xmlns:com="http://schemas.openxmlformats.org/drawingml/2006/compatibility" xmlns:p14="http://schemas.microsoft.com/office/powerpoint/2010/main" showMasterPhAnim="0" showMasterSp="0">
+<p:notes xmlns:a="http://schemas.openxmlformats.org/drawingml/2006/main" xmlns:r="http://schemas.openxmlformats.org/officeDocument/2006/relationships" xmlns:p="http://schemas.openxmlformats.org/presentationml/2006/main" showMasterSp="0" showMasterPhAnim="0">
   <p:cSld>
     <p:spTree>
       <p:nvGrpSpPr>
-        <p:cNvPr id="73" name="Shape 73"/>
+        <p:cNvPr id="1" name="Shape 73"/>
         <p:cNvGrpSpPr/>
         <p:nvPr/>
       </p:nvGrpSpPr>
@@ -594,19 +714,26 @@
       <p:sp>
         <p:nvSpPr>
           <p:cNvPr id="74" name="Shape 74"/>
-          <p:cNvSpPr/>
+          <p:cNvSpPr>
+            <a:spLocks noGrp="1" noRot="1" noChangeAspect="1"/>
+          </p:cNvSpPr>
           <p:nvPr>
-            <p:ph idx="2" type="sldImg"/>
+            <p:ph type="sldImg" idx="2"/>
           </p:nvPr>
         </p:nvSpPr>
         <p:spPr>
           <a:xfrm>
-            <a:off x="381300" y="685800"/>
+            <a:off x="381000" y="685800"/>
             <a:ext cx="6096000" cy="3429000"/>
           </a:xfrm>
           <a:custGeom>
+            <a:avLst/>
+            <a:gdLst/>
+            <a:ahLst/>
+            <a:cxnLst/>
+            <a:rect l="0" t="0" r="0" b="0"/>
             <a:pathLst>
-              <a:path extrusionOk="0" h="120000" w="120000">
+              <a:path w="120000" h="120000" extrusionOk="0">
                 <a:moveTo>
                   <a:pt x="0" y="0"/>
                 </a:moveTo>
@@ -628,9 +755,11 @@
       <p:sp>
         <p:nvSpPr>
           <p:cNvPr id="75" name="Shape 75"/>
-          <p:cNvSpPr txBox="1"/>
+          <p:cNvSpPr txBox="1">
+            <a:spLocks noGrp="1"/>
+          </p:cNvSpPr>
           <p:nvPr>
-            <p:ph idx="1" type="body"/>
+            <p:ph type="body" idx="1"/>
           </p:nvPr>
         </p:nvSpPr>
         <p:spPr>
@@ -643,7 +772,7 @@
           </a:prstGeom>
         </p:spPr>
         <p:txBody>
-          <a:bodyPr anchorCtr="0" anchor="t" bIns="91425" lIns="91425" rIns="91425" tIns="91425">
+          <a:bodyPr lIns="91425" tIns="91425" rIns="91425" bIns="91425" anchor="t" anchorCtr="0">
             <a:noAutofit/>
           </a:bodyPr>
           <a:lstStyle/>
@@ -654,9 +783,6 @@
               </a:spcBef>
               <a:buNone/>
             </a:pPr>
-            <a:r>
-              <a:t/>
-            </a:r>
             <a:endParaRPr/>
           </a:p>
         </p:txBody>
@@ -670,11 +796,11 @@
 </file>
 
 <file path=ppt/notesSlides/notesSlide4.xml><?xml version="1.0" encoding="utf-8"?>
-<p:notes xmlns:a="http://schemas.openxmlformats.org/drawingml/2006/main" xmlns:r="http://schemas.openxmlformats.org/officeDocument/2006/relationships" xmlns:mc="http://schemas.openxmlformats.org/markup-compatibility/2006" xmlns:mv="urn:schemas-microsoft-com:mac:vml" xmlns:p="http://schemas.openxmlformats.org/presentationml/2006/main" xmlns:c="http://schemas.openxmlformats.org/drawingml/2006/chart" xmlns:dgm="http://schemas.openxmlformats.org/drawingml/2006/diagram" xmlns:o="urn:schemas-microsoft-com:office:office" xmlns:v="urn:schemas-microsoft-com:vml" xmlns:pvml="urn:schemas-microsoft-com:office:powerpoint" xmlns:com="http://schemas.openxmlformats.org/drawingml/2006/compatibility" xmlns:p14="http://schemas.microsoft.com/office/powerpoint/2010/main" showMasterPhAnim="0" showMasterSp="0">
+<p:notes xmlns:a="http://schemas.openxmlformats.org/drawingml/2006/main" xmlns:r="http://schemas.openxmlformats.org/officeDocument/2006/relationships" xmlns:p="http://schemas.openxmlformats.org/presentationml/2006/main" showMasterSp="0" showMasterPhAnim="0">
   <p:cSld>
     <p:spTree>
       <p:nvGrpSpPr>
-        <p:cNvPr id="79" name="Shape 79"/>
+        <p:cNvPr id="1" name="Shape 79"/>
         <p:cNvGrpSpPr/>
         <p:nvPr/>
       </p:nvGrpSpPr>
@@ -689,9 +815,11 @@
       <p:sp>
         <p:nvSpPr>
           <p:cNvPr id="80" name="Shape 80"/>
-          <p:cNvSpPr/>
+          <p:cNvSpPr>
+            <a:spLocks noGrp="1" noRot="1" noChangeAspect="1"/>
+          </p:cNvSpPr>
           <p:nvPr>
-            <p:ph idx="2" type="sldImg"/>
+            <p:ph type="sldImg" idx="2"/>
           </p:nvPr>
         </p:nvSpPr>
         <p:spPr>
@@ -700,8 +828,13 @@
             <a:ext cx="6096000" cy="3429000"/>
           </a:xfrm>
           <a:custGeom>
+            <a:avLst/>
+            <a:gdLst/>
+            <a:ahLst/>
+            <a:cxnLst/>
+            <a:rect l="0" t="0" r="0" b="0"/>
             <a:pathLst>
-              <a:path extrusionOk="0" h="120000" w="120000">
+              <a:path w="120000" h="120000" extrusionOk="0">
                 <a:moveTo>
                   <a:pt x="0" y="0"/>
                 </a:moveTo>
@@ -723,9 +856,11 @@
       <p:sp>
         <p:nvSpPr>
           <p:cNvPr id="81" name="Shape 81"/>
-          <p:cNvSpPr txBox="1"/>
+          <p:cNvSpPr txBox="1">
+            <a:spLocks noGrp="1"/>
+          </p:cNvSpPr>
           <p:nvPr>
-            <p:ph idx="1" type="body"/>
+            <p:ph type="body" idx="1"/>
           </p:nvPr>
         </p:nvSpPr>
         <p:spPr>
@@ -738,7 +873,7 @@
           </a:prstGeom>
         </p:spPr>
         <p:txBody>
-          <a:bodyPr anchorCtr="0" anchor="t" bIns="91425" lIns="91425" rIns="91425" tIns="91425">
+          <a:bodyPr lIns="91425" tIns="91425" rIns="91425" bIns="91425" anchor="t" anchorCtr="0">
             <a:noAutofit/>
           </a:bodyPr>
           <a:lstStyle/>
@@ -749,9 +884,6 @@
               </a:spcBef>
               <a:buNone/>
             </a:pPr>
-            <a:r>
-              <a:t/>
-            </a:r>
             <a:endParaRPr/>
           </a:p>
         </p:txBody>
@@ -765,11 +897,11 @@
 </file>
 
 <file path=ppt/notesSlides/notesSlide5.xml><?xml version="1.0" encoding="utf-8"?>
-<p:notes xmlns:a="http://schemas.openxmlformats.org/drawingml/2006/main" xmlns:r="http://schemas.openxmlformats.org/officeDocument/2006/relationships" xmlns:mc="http://schemas.openxmlformats.org/markup-compatibility/2006" xmlns:mv="urn:schemas-microsoft-com:mac:vml" xmlns:p="http://schemas.openxmlformats.org/presentationml/2006/main" xmlns:c="http://schemas.openxmlformats.org/drawingml/2006/chart" xmlns:dgm="http://schemas.openxmlformats.org/drawingml/2006/diagram" xmlns:o="urn:schemas-microsoft-com:office:office" xmlns:v="urn:schemas-microsoft-com:vml" xmlns:pvml="urn:schemas-microsoft-com:office:powerpoint" xmlns:com="http://schemas.openxmlformats.org/drawingml/2006/compatibility" xmlns:p14="http://schemas.microsoft.com/office/powerpoint/2010/main" showMasterPhAnim="0" showMasterSp="0">
+<p:notes xmlns:a="http://schemas.openxmlformats.org/drawingml/2006/main" xmlns:r="http://schemas.openxmlformats.org/officeDocument/2006/relationships" xmlns:p="http://schemas.openxmlformats.org/presentationml/2006/main" showMasterSp="0" showMasterPhAnim="0">
   <p:cSld>
     <p:spTree>
       <p:nvGrpSpPr>
-        <p:cNvPr id="85" name="Shape 85"/>
+        <p:cNvPr id="1" name="Shape 85"/>
         <p:cNvGrpSpPr/>
         <p:nvPr/>
       </p:nvGrpSpPr>
@@ -784,9 +916,11 @@
       <p:sp>
         <p:nvSpPr>
           <p:cNvPr id="86" name="Shape 86"/>
-          <p:cNvSpPr/>
+          <p:cNvSpPr>
+            <a:spLocks noGrp="1" noRot="1" noChangeAspect="1"/>
+          </p:cNvSpPr>
           <p:nvPr>
-            <p:ph idx="2" type="sldImg"/>
+            <p:ph type="sldImg" idx="2"/>
           </p:nvPr>
         </p:nvSpPr>
         <p:spPr>
@@ -795,8 +929,13 @@
             <a:ext cx="6096000" cy="3429000"/>
           </a:xfrm>
           <a:custGeom>
+            <a:avLst/>
+            <a:gdLst/>
+            <a:ahLst/>
+            <a:cxnLst/>
+            <a:rect l="0" t="0" r="0" b="0"/>
             <a:pathLst>
-              <a:path extrusionOk="0" h="120000" w="120000">
+              <a:path w="120000" h="120000" extrusionOk="0">
                 <a:moveTo>
                   <a:pt x="0" y="0"/>
                 </a:moveTo>
@@ -818,9 +957,11 @@
       <p:sp>
         <p:nvSpPr>
           <p:cNvPr id="87" name="Shape 87"/>
-          <p:cNvSpPr txBox="1"/>
+          <p:cNvSpPr txBox="1">
+            <a:spLocks noGrp="1"/>
+          </p:cNvSpPr>
           <p:nvPr>
-            <p:ph idx="1" type="body"/>
+            <p:ph type="body" idx="1"/>
           </p:nvPr>
         </p:nvSpPr>
         <p:spPr>
@@ -833,7 +974,7 @@
           </a:prstGeom>
         </p:spPr>
         <p:txBody>
-          <a:bodyPr anchorCtr="0" anchor="t" bIns="91425" lIns="91425" rIns="91425" tIns="91425">
+          <a:bodyPr lIns="91425" tIns="91425" rIns="91425" bIns="91425" anchor="t" anchorCtr="0">
             <a:noAutofit/>
           </a:bodyPr>
           <a:lstStyle/>
@@ -844,9 +985,6 @@
               </a:spcBef>
               <a:buNone/>
             </a:pPr>
-            <a:r>
-              <a:t/>
-            </a:r>
             <a:endParaRPr/>
           </a:p>
         </p:txBody>
@@ -860,11 +998,11 @@
 </file>
 
 <file path=ppt/slideLayouts/slideLayout1.xml><?xml version="1.0" encoding="utf-8"?>
-<p:sldLayout xmlns:a="http://schemas.openxmlformats.org/drawingml/2006/main" xmlns:r="http://schemas.openxmlformats.org/officeDocument/2006/relationships" xmlns:mc="http://schemas.openxmlformats.org/markup-compatibility/2006" xmlns:mv="urn:schemas-microsoft-com:mac:vml" xmlns:p="http://schemas.openxmlformats.org/presentationml/2006/main" xmlns:c="http://schemas.openxmlformats.org/drawingml/2006/chart" xmlns:dgm="http://schemas.openxmlformats.org/drawingml/2006/diagram" xmlns:o="urn:schemas-microsoft-com:office:office" xmlns:v="urn:schemas-microsoft-com:vml" xmlns:pvml="urn:schemas-microsoft-com:office:powerpoint" xmlns:com="http://schemas.openxmlformats.org/drawingml/2006/compatibility" xmlns:p14="http://schemas.microsoft.com/office/powerpoint/2010/main" type="title">
+<p:sldLayout xmlns:a="http://schemas.openxmlformats.org/drawingml/2006/main" xmlns:r="http://schemas.openxmlformats.org/officeDocument/2006/relationships" xmlns:p="http://schemas.openxmlformats.org/presentationml/2006/main" type="title">
   <p:cSld name="Title slide">
     <p:spTree>
       <p:nvGrpSpPr>
-        <p:cNvPr id="9" name="Shape 9"/>
+        <p:cNvPr id="1" name="Shape 9"/>
         <p:cNvGrpSpPr/>
         <p:nvPr/>
       </p:nvGrpSpPr>
@@ -888,8 +1026,13 @@
             <a:ext cx="1081625" cy="1124949"/>
           </a:xfrm>
           <a:custGeom>
+            <a:avLst/>
+            <a:gdLst/>
+            <a:ahLst/>
+            <a:cxnLst/>
+            <a:rect l="0" t="0" r="0" b="0"/>
             <a:pathLst>
-              <a:path extrusionOk="0" h="44998" w="43265">
+              <a:path w="43265" h="44998" extrusionOk="0">
                 <a:moveTo>
                   <a:pt x="0" y="44998"/>
                 </a:moveTo>
@@ -903,14 +1046,14 @@
             </a:pathLst>
           </a:custGeom>
           <a:noFill/>
-          <a:ln cap="flat" cmpd="sng" w="28575">
+          <a:ln w="28575" cap="flat" cmpd="sng">
             <a:solidFill>
               <a:schemeClr val="accent5"/>
             </a:solidFill>
             <a:prstDash val="solid"/>
             <a:miter/>
-            <a:headEnd len="med" w="med" type="none"/>
-            <a:tailEnd len="med" w="med" type="none"/>
+            <a:headEnd type="none" w="med" len="med"/>
+            <a:tailEnd type="none" w="med" len="med"/>
           </a:ln>
         </p:spPr>
       </p:sp>
@@ -926,8 +1069,13 @@
             <a:ext cx="1081625" cy="1124950"/>
           </a:xfrm>
           <a:custGeom>
+            <a:avLst/>
+            <a:gdLst/>
+            <a:ahLst/>
+            <a:cxnLst/>
+            <a:rect l="0" t="0" r="0" b="0"/>
             <a:pathLst>
-              <a:path extrusionOk="0" h="44998" w="43265">
+              <a:path w="43265" h="44998" extrusionOk="0">
                 <a:moveTo>
                   <a:pt x="0" y="44998"/>
                 </a:moveTo>
@@ -941,14 +1089,14 @@
             </a:pathLst>
           </a:custGeom>
           <a:noFill/>
-          <a:ln cap="flat" cmpd="sng" w="28575">
+          <a:ln w="28575" cap="flat" cmpd="sng">
             <a:solidFill>
               <a:schemeClr val="accent5"/>
             </a:solidFill>
             <a:prstDash val="solid"/>
             <a:miter/>
-            <a:headEnd len="med" w="med" type="none"/>
-            <a:tailEnd len="med" w="med" type="none"/>
+            <a:headEnd type="none" w="med" len="med"/>
+            <a:tailEnd type="none" w="med" len="med"/>
           </a:ln>
         </p:spPr>
       </p:sp>
@@ -967,21 +1115,23 @@
             <a:avLst/>
           </a:prstGeom>
           <a:noFill/>
-          <a:ln cap="flat" cmpd="sng" w="38100">
+          <a:ln w="38100" cap="flat" cmpd="sng">
             <a:solidFill>
               <a:schemeClr val="accent4"/>
             </a:solidFill>
             <a:prstDash val="solid"/>
             <a:round/>
-            <a:headEnd len="med" w="med" type="none"/>
-            <a:tailEnd len="med" w="med" type="none"/>
+            <a:headEnd type="none" w="med" len="med"/>
+            <a:tailEnd type="none" w="med" len="med"/>
           </a:ln>
         </p:spPr>
       </p:cxnSp>
       <p:sp>
         <p:nvSpPr>
           <p:cNvPr id="13" name="Shape 13"/>
-          <p:cNvSpPr txBox="1"/>
+          <p:cNvSpPr txBox="1">
+            <a:spLocks noGrp="1"/>
+          </p:cNvSpPr>
           <p:nvPr>
             <p:ph type="ctrTitle"/>
           </p:nvPr>
@@ -996,7 +1146,7 @@
           </a:prstGeom>
         </p:spPr>
         <p:txBody>
-          <a:bodyPr anchorCtr="0" anchor="b" bIns="91425" lIns="91425" rIns="91425" tIns="91425"/>
+          <a:bodyPr lIns="91425" tIns="91425" rIns="91425" bIns="91425" anchor="b" anchorCtr="0"/>
           <a:lstStyle>
             <a:lvl1pPr lvl="0" algn="ctr">
               <a:spcBef>
@@ -1062,15 +1212,19 @@
               <a:defRPr sz="4000"/>
             </a:lvl9pPr>
           </a:lstStyle>
-          <a:p/>
+          <a:p>
+            <a:endParaRPr/>
+          </a:p>
         </p:txBody>
       </p:sp>
       <p:sp>
         <p:nvSpPr>
           <p:cNvPr id="14" name="Shape 14"/>
-          <p:cNvSpPr txBox="1"/>
+          <p:cNvSpPr txBox="1">
+            <a:spLocks noGrp="1"/>
+          </p:cNvSpPr>
           <p:nvPr>
-            <p:ph idx="1" type="subTitle"/>
+            <p:ph type="subTitle" idx="1"/>
           </p:nvPr>
         </p:nvSpPr>
         <p:spPr>
@@ -1083,7 +1237,7 @@
           </a:prstGeom>
         </p:spPr>
         <p:txBody>
-          <a:bodyPr anchorCtr="0" anchor="t" bIns="91425" lIns="91425" rIns="91425" tIns="91425"/>
+          <a:bodyPr lIns="91425" tIns="91425" rIns="91425" bIns="91425" anchor="t" anchorCtr="0"/>
           <a:lstStyle>
             <a:lvl1pPr lvl="0" algn="ctr">
               <a:lnSpc>
@@ -1320,15 +1474,19 @@
               </a:defRPr>
             </a:lvl9pPr>
           </a:lstStyle>
-          <a:p/>
+          <a:p>
+            <a:endParaRPr/>
+          </a:p>
         </p:txBody>
       </p:sp>
       <p:sp>
         <p:nvSpPr>
           <p:cNvPr id="15" name="Shape 15"/>
-          <p:cNvSpPr txBox="1"/>
+          <p:cNvSpPr txBox="1">
+            <a:spLocks noGrp="1"/>
+          </p:cNvSpPr>
           <p:nvPr>
-            <p:ph idx="12" type="sldNum"/>
+            <p:ph type="sldNum" idx="12"/>
           </p:nvPr>
         </p:nvSpPr>
         <p:spPr>
@@ -1341,7 +1499,7 @@
           </a:prstGeom>
         </p:spPr>
         <p:txBody>
-          <a:bodyPr anchorCtr="0" anchor="ctr" bIns="91425" lIns="91425" rIns="91425" tIns="91425">
+          <a:bodyPr lIns="91425" tIns="91425" rIns="91425" bIns="91425" anchor="ctr" anchorCtr="0">
             <a:noAutofit/>
           </a:bodyPr>
           <a:lstStyle/>
@@ -1356,6 +1514,7 @@
               <a:rPr lang="zh-TW"/>
               <a:t>‹#›</a:t>
             </a:fld>
+            <a:endParaRPr lang="zh-TW"/>
           </a:p>
         </p:txBody>
       </p:sp>
@@ -1368,11 +1527,11 @@
 </file>
 
 <file path=ppt/slideLayouts/slideLayout10.xml><?xml version="1.0" encoding="utf-8"?>
-<p:sldLayout xmlns:a="http://schemas.openxmlformats.org/drawingml/2006/main" xmlns:r="http://schemas.openxmlformats.org/officeDocument/2006/relationships" xmlns:mc="http://schemas.openxmlformats.org/markup-compatibility/2006" xmlns:mv="urn:schemas-microsoft-com:mac:vml" xmlns:p="http://schemas.openxmlformats.org/presentationml/2006/main" xmlns:c="http://schemas.openxmlformats.org/drawingml/2006/chart" xmlns:dgm="http://schemas.openxmlformats.org/drawingml/2006/diagram" xmlns:o="urn:schemas-microsoft-com:office:office" xmlns:v="urn:schemas-microsoft-com:vml" xmlns:pvml="urn:schemas-microsoft-com:office:powerpoint" xmlns:com="http://schemas.openxmlformats.org/drawingml/2006/compatibility" xmlns:p14="http://schemas.microsoft.com/office/powerpoint/2010/main">
+<p:sldLayout xmlns:a="http://schemas.openxmlformats.org/drawingml/2006/main" xmlns:r="http://schemas.openxmlformats.org/officeDocument/2006/relationships" xmlns:p="http://schemas.openxmlformats.org/presentationml/2006/main">
   <p:cSld name="Big number">
     <p:spTree>
       <p:nvGrpSpPr>
-        <p:cNvPr id="52" name="Shape 52"/>
+        <p:cNvPr id="1" name="Shape 52"/>
         <p:cNvGrpSpPr/>
         <p:nvPr/>
       </p:nvGrpSpPr>
@@ -1406,7 +1565,7 @@
           </a:ln>
         </p:spPr>
         <p:txBody>
-          <a:bodyPr anchorCtr="0" anchor="ctr" bIns="91425" lIns="91425" rIns="91425" tIns="91425">
+          <a:bodyPr lIns="91425" tIns="91425" rIns="91425" bIns="91425" anchor="ctr" anchorCtr="0">
             <a:noAutofit/>
           </a:bodyPr>
           <a:lstStyle/>
@@ -1417,9 +1576,6 @@
               </a:spcBef>
               <a:buNone/>
             </a:pPr>
-            <a:r>
-              <a:t/>
-            </a:r>
             <a:endParaRPr/>
           </a:p>
         </p:txBody>
@@ -1427,7 +1583,9 @@
       <p:sp>
         <p:nvSpPr>
           <p:cNvPr id="54" name="Shape 54"/>
-          <p:cNvSpPr txBox="1"/>
+          <p:cNvSpPr txBox="1">
+            <a:spLocks noGrp="1"/>
+          </p:cNvSpPr>
           <p:nvPr>
             <p:ph type="title"/>
           </p:nvPr>
@@ -1442,7 +1600,7 @@
           </a:prstGeom>
         </p:spPr>
         <p:txBody>
-          <a:bodyPr anchorCtr="0" anchor="ctr" bIns="91425" lIns="91425" rIns="91425" tIns="91425"/>
+          <a:bodyPr lIns="91425" tIns="91425" rIns="91425" bIns="91425" anchor="ctr" anchorCtr="0"/>
           <a:lstStyle>
             <a:lvl1pPr lvl="0" algn="ctr">
               <a:spcBef>
@@ -1571,15 +1729,19 @@
               </a:defRPr>
             </a:lvl9pPr>
           </a:lstStyle>
-          <a:p/>
+          <a:p>
+            <a:endParaRPr/>
+          </a:p>
         </p:txBody>
       </p:sp>
       <p:sp>
         <p:nvSpPr>
           <p:cNvPr id="55" name="Shape 55"/>
-          <p:cNvSpPr txBox="1"/>
+          <p:cNvSpPr txBox="1">
+            <a:spLocks noGrp="1"/>
+          </p:cNvSpPr>
           <p:nvPr>
-            <p:ph idx="1" type="body"/>
+            <p:ph type="body" idx="1"/>
           </p:nvPr>
         </p:nvSpPr>
         <p:spPr>
@@ -1592,7 +1754,7 @@
           </a:prstGeom>
         </p:spPr>
         <p:txBody>
-          <a:bodyPr anchorCtr="0" anchor="t" bIns="91425" lIns="91425" rIns="91425" tIns="91425"/>
+          <a:bodyPr lIns="91425" tIns="91425" rIns="91425" bIns="91425" anchor="t" anchorCtr="0"/>
           <a:lstStyle>
             <a:lvl1pPr lvl="0" algn="ctr">
               <a:spcBef>
@@ -1649,15 +1811,19 @@
               <a:defRPr/>
             </a:lvl9pPr>
           </a:lstStyle>
-          <a:p/>
+          <a:p>
+            <a:endParaRPr/>
+          </a:p>
         </p:txBody>
       </p:sp>
       <p:sp>
         <p:nvSpPr>
           <p:cNvPr id="56" name="Shape 56"/>
-          <p:cNvSpPr txBox="1"/>
+          <p:cNvSpPr txBox="1">
+            <a:spLocks noGrp="1"/>
+          </p:cNvSpPr>
           <p:nvPr>
-            <p:ph idx="12" type="sldNum"/>
+            <p:ph type="sldNum" idx="12"/>
           </p:nvPr>
         </p:nvSpPr>
         <p:spPr>
@@ -1670,7 +1836,7 @@
           </a:prstGeom>
         </p:spPr>
         <p:txBody>
-          <a:bodyPr anchorCtr="0" anchor="ctr" bIns="91425" lIns="91425" rIns="91425" tIns="91425">
+          <a:bodyPr lIns="91425" tIns="91425" rIns="91425" bIns="91425" anchor="ctr" anchorCtr="0">
             <a:noAutofit/>
           </a:bodyPr>
           <a:lstStyle/>
@@ -1685,6 +1851,7 @@
               <a:rPr lang="zh-TW"/>
               <a:t>‹#›</a:t>
             </a:fld>
+            <a:endParaRPr lang="zh-TW"/>
           </a:p>
         </p:txBody>
       </p:sp>
@@ -1697,11 +1864,11 @@
 </file>
 
 <file path=ppt/slideLayouts/slideLayout11.xml><?xml version="1.0" encoding="utf-8"?>
-<p:sldLayout xmlns:a="http://schemas.openxmlformats.org/drawingml/2006/main" xmlns:r="http://schemas.openxmlformats.org/officeDocument/2006/relationships" xmlns:mc="http://schemas.openxmlformats.org/markup-compatibility/2006" xmlns:mv="urn:schemas-microsoft-com:mac:vml" xmlns:p="http://schemas.openxmlformats.org/presentationml/2006/main" xmlns:c="http://schemas.openxmlformats.org/drawingml/2006/chart" xmlns:dgm="http://schemas.openxmlformats.org/drawingml/2006/diagram" xmlns:o="urn:schemas-microsoft-com:office:office" xmlns:v="urn:schemas-microsoft-com:vml" xmlns:pvml="urn:schemas-microsoft-com:office:powerpoint" xmlns:com="http://schemas.openxmlformats.org/drawingml/2006/compatibility" xmlns:p14="http://schemas.microsoft.com/office/powerpoint/2010/main" type="blank">
+<p:sldLayout xmlns:a="http://schemas.openxmlformats.org/drawingml/2006/main" xmlns:r="http://schemas.openxmlformats.org/officeDocument/2006/relationships" xmlns:p="http://schemas.openxmlformats.org/presentationml/2006/main" type="blank">
   <p:cSld name="Blank">
     <p:spTree>
       <p:nvGrpSpPr>
-        <p:cNvPr id="57" name="Shape 57"/>
+        <p:cNvPr id="1" name="Shape 57"/>
         <p:cNvGrpSpPr/>
         <p:nvPr/>
       </p:nvGrpSpPr>
@@ -1716,9 +1883,11 @@
       <p:sp>
         <p:nvSpPr>
           <p:cNvPr id="58" name="Shape 58"/>
-          <p:cNvSpPr txBox="1"/>
+          <p:cNvSpPr txBox="1">
+            <a:spLocks noGrp="1"/>
+          </p:cNvSpPr>
           <p:nvPr>
-            <p:ph idx="12" type="sldNum"/>
+            <p:ph type="sldNum" idx="12"/>
           </p:nvPr>
         </p:nvSpPr>
         <p:spPr>
@@ -1731,7 +1900,7 @@
           </a:prstGeom>
         </p:spPr>
         <p:txBody>
-          <a:bodyPr anchorCtr="0" anchor="ctr" bIns="91425" lIns="91425" rIns="91425" tIns="91425">
+          <a:bodyPr lIns="91425" tIns="91425" rIns="91425" bIns="91425" anchor="ctr" anchorCtr="0">
             <a:noAutofit/>
           </a:bodyPr>
           <a:lstStyle/>
@@ -1746,6 +1915,7 @@
               <a:rPr lang="zh-TW"/>
               <a:t>‹#›</a:t>
             </a:fld>
+            <a:endParaRPr lang="zh-TW"/>
           </a:p>
         </p:txBody>
       </p:sp>
@@ -1758,11 +1928,11 @@
 </file>
 
 <file path=ppt/slideLayouts/slideLayout2.xml><?xml version="1.0" encoding="utf-8"?>
-<p:sldLayout xmlns:a="http://schemas.openxmlformats.org/drawingml/2006/main" xmlns:r="http://schemas.openxmlformats.org/officeDocument/2006/relationships" xmlns:mc="http://schemas.openxmlformats.org/markup-compatibility/2006" xmlns:mv="urn:schemas-microsoft-com:mac:vml" xmlns:p="http://schemas.openxmlformats.org/presentationml/2006/main" xmlns:c="http://schemas.openxmlformats.org/drawingml/2006/chart" xmlns:dgm="http://schemas.openxmlformats.org/drawingml/2006/diagram" xmlns:o="urn:schemas-microsoft-com:office:office" xmlns:v="urn:schemas-microsoft-com:vml" xmlns:pvml="urn:schemas-microsoft-com:office:powerpoint" xmlns:com="http://schemas.openxmlformats.org/drawingml/2006/compatibility" xmlns:p14="http://schemas.microsoft.com/office/powerpoint/2010/main" type="secHead">
+<p:sldLayout xmlns:a="http://schemas.openxmlformats.org/drawingml/2006/main" xmlns:r="http://schemas.openxmlformats.org/officeDocument/2006/relationships" xmlns:p="http://schemas.openxmlformats.org/presentationml/2006/main" type="secHead">
   <p:cSld name="Section header">
     <p:spTree>
       <p:nvGrpSpPr>
-        <p:cNvPr id="16" name="Shape 16"/>
+        <p:cNvPr id="1" name="Shape 16"/>
         <p:cNvGrpSpPr/>
         <p:nvPr/>
       </p:nvGrpSpPr>
@@ -1789,21 +1959,23 @@
             <a:avLst/>
           </a:prstGeom>
           <a:noFill/>
-          <a:ln cap="flat" cmpd="sng" w="38100">
+          <a:ln w="38100" cap="flat" cmpd="sng">
             <a:solidFill>
               <a:schemeClr val="accent4"/>
             </a:solidFill>
             <a:prstDash val="solid"/>
             <a:round/>
-            <a:headEnd len="med" w="med" type="none"/>
-            <a:tailEnd len="med" w="med" type="none"/>
+            <a:headEnd type="none" w="med" len="med"/>
+            <a:tailEnd type="none" w="med" len="med"/>
           </a:ln>
         </p:spPr>
       </p:cxnSp>
       <p:sp>
         <p:nvSpPr>
           <p:cNvPr id="18" name="Shape 18"/>
-          <p:cNvSpPr txBox="1"/>
+          <p:cNvSpPr txBox="1">
+            <a:spLocks noGrp="1"/>
+          </p:cNvSpPr>
           <p:nvPr>
             <p:ph type="title"/>
           </p:nvPr>
@@ -1818,7 +1990,7 @@
           </a:prstGeom>
         </p:spPr>
         <p:txBody>
-          <a:bodyPr anchorCtr="0" anchor="b" bIns="91425" lIns="91425" rIns="91425" tIns="91425"/>
+          <a:bodyPr lIns="91425" tIns="91425" rIns="91425" bIns="91425" anchor="b" anchorCtr="0"/>
           <a:lstStyle>
             <a:lvl1pPr lvl="0" algn="ctr">
               <a:spcBef>
@@ -1884,15 +2056,19 @@
               <a:defRPr sz="4800"/>
             </a:lvl9pPr>
           </a:lstStyle>
-          <a:p/>
+          <a:p>
+            <a:endParaRPr/>
+          </a:p>
         </p:txBody>
       </p:sp>
       <p:sp>
         <p:nvSpPr>
           <p:cNvPr id="19" name="Shape 19"/>
-          <p:cNvSpPr txBox="1"/>
+          <p:cNvSpPr txBox="1">
+            <a:spLocks noGrp="1"/>
+          </p:cNvSpPr>
           <p:nvPr>
-            <p:ph idx="12" type="sldNum"/>
+            <p:ph type="sldNum" idx="12"/>
           </p:nvPr>
         </p:nvSpPr>
         <p:spPr>
@@ -1905,7 +2081,7 @@
           </a:prstGeom>
         </p:spPr>
         <p:txBody>
-          <a:bodyPr anchorCtr="0" anchor="ctr" bIns="91425" lIns="91425" rIns="91425" tIns="91425">
+          <a:bodyPr lIns="91425" tIns="91425" rIns="91425" bIns="91425" anchor="ctr" anchorCtr="0">
             <a:noAutofit/>
           </a:bodyPr>
           <a:lstStyle/>
@@ -1920,6 +2096,7 @@
               <a:rPr lang="zh-TW"/>
               <a:t>‹#›</a:t>
             </a:fld>
+            <a:endParaRPr lang="zh-TW"/>
           </a:p>
         </p:txBody>
       </p:sp>
@@ -1932,11 +2109,11 @@
 </file>
 
 <file path=ppt/slideLayouts/slideLayout3.xml><?xml version="1.0" encoding="utf-8"?>
-<p:sldLayout xmlns:a="http://schemas.openxmlformats.org/drawingml/2006/main" xmlns:r="http://schemas.openxmlformats.org/officeDocument/2006/relationships" xmlns:mc="http://schemas.openxmlformats.org/markup-compatibility/2006" xmlns:mv="urn:schemas-microsoft-com:mac:vml" xmlns:p="http://schemas.openxmlformats.org/presentationml/2006/main" xmlns:c="http://schemas.openxmlformats.org/drawingml/2006/chart" xmlns:dgm="http://schemas.openxmlformats.org/drawingml/2006/diagram" xmlns:o="urn:schemas-microsoft-com:office:office" xmlns:v="urn:schemas-microsoft-com:vml" xmlns:pvml="urn:schemas-microsoft-com:office:powerpoint" xmlns:com="http://schemas.openxmlformats.org/drawingml/2006/compatibility" xmlns:p14="http://schemas.microsoft.com/office/powerpoint/2010/main" type="tx">
+<p:sldLayout xmlns:a="http://schemas.openxmlformats.org/drawingml/2006/main" xmlns:r="http://schemas.openxmlformats.org/officeDocument/2006/relationships" xmlns:p="http://schemas.openxmlformats.org/presentationml/2006/main" type="tx">
   <p:cSld name="Title and body">
     <p:spTree>
       <p:nvGrpSpPr>
-        <p:cNvPr id="20" name="Shape 20"/>
+        <p:cNvPr id="1" name="Shape 20"/>
         <p:cNvGrpSpPr/>
         <p:nvPr/>
       </p:nvGrpSpPr>
@@ -1963,21 +2140,23 @@
             <a:avLst/>
           </a:prstGeom>
           <a:noFill/>
-          <a:ln cap="flat" cmpd="sng" w="38100">
+          <a:ln w="38100" cap="flat" cmpd="sng">
             <a:solidFill>
               <a:schemeClr val="accent4"/>
             </a:solidFill>
             <a:prstDash val="solid"/>
             <a:round/>
-            <a:headEnd len="med" w="med" type="none"/>
-            <a:tailEnd len="med" w="med" type="none"/>
+            <a:headEnd type="none" w="med" len="med"/>
+            <a:tailEnd type="none" w="med" len="med"/>
           </a:ln>
         </p:spPr>
       </p:cxnSp>
       <p:sp>
         <p:nvSpPr>
           <p:cNvPr id="22" name="Shape 22"/>
-          <p:cNvSpPr txBox="1"/>
+          <p:cNvSpPr txBox="1">
+            <a:spLocks noGrp="1"/>
+          </p:cNvSpPr>
           <p:nvPr>
             <p:ph type="title"/>
           </p:nvPr>
@@ -1992,7 +2171,7 @@
           </a:prstGeom>
         </p:spPr>
         <p:txBody>
-          <a:bodyPr anchorCtr="0" anchor="b" bIns="91425" lIns="91425" rIns="91425" tIns="91425"/>
+          <a:bodyPr lIns="91425" tIns="91425" rIns="91425" bIns="91425" anchor="b" anchorCtr="0"/>
           <a:lstStyle>
             <a:lvl1pPr lvl="0">
               <a:spcBef>
@@ -2049,15 +2228,19 @@
               <a:defRPr/>
             </a:lvl9pPr>
           </a:lstStyle>
-          <a:p/>
+          <a:p>
+            <a:endParaRPr/>
+          </a:p>
         </p:txBody>
       </p:sp>
       <p:sp>
         <p:nvSpPr>
           <p:cNvPr id="23" name="Shape 23"/>
-          <p:cNvSpPr txBox="1"/>
+          <p:cNvSpPr txBox="1">
+            <a:spLocks noGrp="1"/>
+          </p:cNvSpPr>
           <p:nvPr>
-            <p:ph idx="1" type="body"/>
+            <p:ph type="body" idx="1"/>
           </p:nvPr>
         </p:nvSpPr>
         <p:spPr>
@@ -2070,7 +2253,7 @@
           </a:prstGeom>
         </p:spPr>
         <p:txBody>
-          <a:bodyPr anchorCtr="0" anchor="t" bIns="91425" lIns="91425" rIns="91425" tIns="91425"/>
+          <a:bodyPr lIns="91425" tIns="91425" rIns="91425" bIns="91425" anchor="t" anchorCtr="0"/>
           <a:lstStyle>
             <a:lvl1pPr lvl="0">
               <a:spcBef>
@@ -2127,15 +2310,19 @@
               <a:defRPr/>
             </a:lvl9pPr>
           </a:lstStyle>
-          <a:p/>
+          <a:p>
+            <a:endParaRPr/>
+          </a:p>
         </p:txBody>
       </p:sp>
       <p:sp>
         <p:nvSpPr>
           <p:cNvPr id="24" name="Shape 24"/>
-          <p:cNvSpPr txBox="1"/>
+          <p:cNvSpPr txBox="1">
+            <a:spLocks noGrp="1"/>
+          </p:cNvSpPr>
           <p:nvPr>
-            <p:ph idx="12" type="sldNum"/>
+            <p:ph type="sldNum" idx="12"/>
           </p:nvPr>
         </p:nvSpPr>
         <p:spPr>
@@ -2148,7 +2335,7 @@
           </a:prstGeom>
         </p:spPr>
         <p:txBody>
-          <a:bodyPr anchorCtr="0" anchor="ctr" bIns="91425" lIns="91425" rIns="91425" tIns="91425">
+          <a:bodyPr lIns="91425" tIns="91425" rIns="91425" bIns="91425" anchor="ctr" anchorCtr="0">
             <a:noAutofit/>
           </a:bodyPr>
           <a:lstStyle/>
@@ -2163,6 +2350,7 @@
               <a:rPr lang="zh-TW"/>
               <a:t>‹#›</a:t>
             </a:fld>
+            <a:endParaRPr lang="zh-TW"/>
           </a:p>
         </p:txBody>
       </p:sp>
@@ -2175,11 +2363,11 @@
 </file>
 
 <file path=ppt/slideLayouts/slideLayout4.xml><?xml version="1.0" encoding="utf-8"?>
-<p:sldLayout xmlns:a="http://schemas.openxmlformats.org/drawingml/2006/main" xmlns:r="http://schemas.openxmlformats.org/officeDocument/2006/relationships" xmlns:mc="http://schemas.openxmlformats.org/markup-compatibility/2006" xmlns:mv="urn:schemas-microsoft-com:mac:vml" xmlns:p="http://schemas.openxmlformats.org/presentationml/2006/main" xmlns:c="http://schemas.openxmlformats.org/drawingml/2006/chart" xmlns:dgm="http://schemas.openxmlformats.org/drawingml/2006/diagram" xmlns:o="urn:schemas-microsoft-com:office:office" xmlns:v="urn:schemas-microsoft-com:vml" xmlns:pvml="urn:schemas-microsoft-com:office:powerpoint" xmlns:com="http://schemas.openxmlformats.org/drawingml/2006/compatibility" xmlns:p14="http://schemas.microsoft.com/office/powerpoint/2010/main" type="twoColTx">
+<p:sldLayout xmlns:a="http://schemas.openxmlformats.org/drawingml/2006/main" xmlns:r="http://schemas.openxmlformats.org/officeDocument/2006/relationships" xmlns:p="http://schemas.openxmlformats.org/presentationml/2006/main" type="twoColTx">
   <p:cSld name="Title and two columns">
     <p:spTree>
       <p:nvGrpSpPr>
-        <p:cNvPr id="25" name="Shape 25"/>
+        <p:cNvPr id="1" name="Shape 25"/>
         <p:cNvGrpSpPr/>
         <p:nvPr/>
       </p:nvGrpSpPr>
@@ -2206,21 +2394,23 @@
             <a:avLst/>
           </a:prstGeom>
           <a:noFill/>
-          <a:ln cap="flat" cmpd="sng" w="38100">
+          <a:ln w="38100" cap="flat" cmpd="sng">
             <a:solidFill>
               <a:schemeClr val="accent4"/>
             </a:solidFill>
             <a:prstDash val="solid"/>
             <a:round/>
-            <a:headEnd len="med" w="med" type="none"/>
-            <a:tailEnd len="med" w="med" type="none"/>
+            <a:headEnd type="none" w="med" len="med"/>
+            <a:tailEnd type="none" w="med" len="med"/>
           </a:ln>
         </p:spPr>
       </p:cxnSp>
       <p:sp>
         <p:nvSpPr>
           <p:cNvPr id="27" name="Shape 27"/>
-          <p:cNvSpPr txBox="1"/>
+          <p:cNvSpPr txBox="1">
+            <a:spLocks noGrp="1"/>
+          </p:cNvSpPr>
           <p:nvPr>
             <p:ph type="title"/>
           </p:nvPr>
@@ -2235,7 +2425,7 @@
           </a:prstGeom>
         </p:spPr>
         <p:txBody>
-          <a:bodyPr anchorCtr="0" anchor="b" bIns="91425" lIns="91425" rIns="91425" tIns="91425"/>
+          <a:bodyPr lIns="91425" tIns="91425" rIns="91425" bIns="91425" anchor="b" anchorCtr="0"/>
           <a:lstStyle>
             <a:lvl1pPr lvl="0">
               <a:spcBef>
@@ -2292,15 +2482,19 @@
               <a:defRPr/>
             </a:lvl9pPr>
           </a:lstStyle>
-          <a:p/>
+          <a:p>
+            <a:endParaRPr/>
+          </a:p>
         </p:txBody>
       </p:sp>
       <p:sp>
         <p:nvSpPr>
           <p:cNvPr id="28" name="Shape 28"/>
-          <p:cNvSpPr txBox="1"/>
+          <p:cNvSpPr txBox="1">
+            <a:spLocks noGrp="1"/>
+          </p:cNvSpPr>
           <p:nvPr>
-            <p:ph idx="1" type="body"/>
+            <p:ph type="body" idx="1"/>
           </p:nvPr>
         </p:nvSpPr>
         <p:spPr>
@@ -2313,7 +2507,7 @@
           </a:prstGeom>
         </p:spPr>
         <p:txBody>
-          <a:bodyPr anchorCtr="0" anchor="t" bIns="91425" lIns="91425" rIns="91425" tIns="91425"/>
+          <a:bodyPr lIns="91425" tIns="91425" rIns="91425" bIns="91425" anchor="t" anchorCtr="0"/>
           <a:lstStyle>
             <a:lvl1pPr lvl="0">
               <a:spcBef>
@@ -2379,15 +2573,19 @@
               <a:defRPr sz="1200"/>
             </a:lvl9pPr>
           </a:lstStyle>
-          <a:p/>
+          <a:p>
+            <a:endParaRPr/>
+          </a:p>
         </p:txBody>
       </p:sp>
       <p:sp>
         <p:nvSpPr>
           <p:cNvPr id="29" name="Shape 29"/>
-          <p:cNvSpPr txBox="1"/>
+          <p:cNvSpPr txBox="1">
+            <a:spLocks noGrp="1"/>
+          </p:cNvSpPr>
           <p:nvPr>
-            <p:ph idx="2" type="body"/>
+            <p:ph type="body" idx="2"/>
           </p:nvPr>
         </p:nvSpPr>
         <p:spPr>
@@ -2400,7 +2598,7 @@
           </a:prstGeom>
         </p:spPr>
         <p:txBody>
-          <a:bodyPr anchorCtr="0" anchor="t" bIns="91425" lIns="91425" rIns="91425" tIns="91425"/>
+          <a:bodyPr lIns="91425" tIns="91425" rIns="91425" bIns="91425" anchor="t" anchorCtr="0"/>
           <a:lstStyle>
             <a:lvl1pPr lvl="0">
               <a:spcBef>
@@ -2466,15 +2664,19 @@
               <a:defRPr sz="1200"/>
             </a:lvl9pPr>
           </a:lstStyle>
-          <a:p/>
+          <a:p>
+            <a:endParaRPr/>
+          </a:p>
         </p:txBody>
       </p:sp>
       <p:sp>
         <p:nvSpPr>
           <p:cNvPr id="30" name="Shape 30"/>
-          <p:cNvSpPr txBox="1"/>
+          <p:cNvSpPr txBox="1">
+            <a:spLocks noGrp="1"/>
+          </p:cNvSpPr>
           <p:nvPr>
-            <p:ph idx="12" type="sldNum"/>
+            <p:ph type="sldNum" idx="12"/>
           </p:nvPr>
         </p:nvSpPr>
         <p:spPr>
@@ -2487,7 +2689,7 @@
           </a:prstGeom>
         </p:spPr>
         <p:txBody>
-          <a:bodyPr anchorCtr="0" anchor="ctr" bIns="91425" lIns="91425" rIns="91425" tIns="91425">
+          <a:bodyPr lIns="91425" tIns="91425" rIns="91425" bIns="91425" anchor="ctr" anchorCtr="0">
             <a:noAutofit/>
           </a:bodyPr>
           <a:lstStyle/>
@@ -2502,6 +2704,7 @@
               <a:rPr lang="zh-TW"/>
               <a:t>‹#›</a:t>
             </a:fld>
+            <a:endParaRPr lang="zh-TW"/>
           </a:p>
         </p:txBody>
       </p:sp>
@@ -2514,11 +2717,11 @@
 </file>
 
 <file path=ppt/slideLayouts/slideLayout5.xml><?xml version="1.0" encoding="utf-8"?>
-<p:sldLayout xmlns:a="http://schemas.openxmlformats.org/drawingml/2006/main" xmlns:r="http://schemas.openxmlformats.org/officeDocument/2006/relationships" xmlns:mc="http://schemas.openxmlformats.org/markup-compatibility/2006" xmlns:mv="urn:schemas-microsoft-com:mac:vml" xmlns:p="http://schemas.openxmlformats.org/presentationml/2006/main" xmlns:c="http://schemas.openxmlformats.org/drawingml/2006/chart" xmlns:dgm="http://schemas.openxmlformats.org/drawingml/2006/diagram" xmlns:o="urn:schemas-microsoft-com:office:office" xmlns:v="urn:schemas-microsoft-com:vml" xmlns:pvml="urn:schemas-microsoft-com:office:powerpoint" xmlns:com="http://schemas.openxmlformats.org/drawingml/2006/compatibility" xmlns:p14="http://schemas.microsoft.com/office/powerpoint/2010/main" type="titleOnly">
+<p:sldLayout xmlns:a="http://schemas.openxmlformats.org/drawingml/2006/main" xmlns:r="http://schemas.openxmlformats.org/officeDocument/2006/relationships" xmlns:p="http://schemas.openxmlformats.org/presentationml/2006/main" type="titleOnly">
   <p:cSld name="Title only">
     <p:spTree>
       <p:nvGrpSpPr>
-        <p:cNvPr id="31" name="Shape 31"/>
+        <p:cNvPr id="1" name="Shape 31"/>
         <p:cNvGrpSpPr/>
         <p:nvPr/>
       </p:nvGrpSpPr>
@@ -2533,7 +2736,9 @@
       <p:sp>
         <p:nvSpPr>
           <p:cNvPr id="32" name="Shape 32"/>
-          <p:cNvSpPr txBox="1"/>
+          <p:cNvSpPr txBox="1">
+            <a:spLocks noGrp="1"/>
+          </p:cNvSpPr>
           <p:nvPr>
             <p:ph type="title"/>
           </p:nvPr>
@@ -2548,7 +2753,7 @@
           </a:prstGeom>
         </p:spPr>
         <p:txBody>
-          <a:bodyPr anchorCtr="0" anchor="b" bIns="91425" lIns="91425" rIns="91425" tIns="91425"/>
+          <a:bodyPr lIns="91425" tIns="91425" rIns="91425" bIns="91425" anchor="b" anchorCtr="0"/>
           <a:lstStyle>
             <a:lvl1pPr lvl="0">
               <a:spcBef>
@@ -2605,15 +2810,19 @@
               <a:defRPr/>
             </a:lvl9pPr>
           </a:lstStyle>
-          <a:p/>
+          <a:p>
+            <a:endParaRPr/>
+          </a:p>
         </p:txBody>
       </p:sp>
       <p:sp>
         <p:nvSpPr>
           <p:cNvPr id="33" name="Shape 33"/>
-          <p:cNvSpPr txBox="1"/>
+          <p:cNvSpPr txBox="1">
+            <a:spLocks noGrp="1"/>
+          </p:cNvSpPr>
           <p:nvPr>
-            <p:ph idx="12" type="sldNum"/>
+            <p:ph type="sldNum" idx="12"/>
           </p:nvPr>
         </p:nvSpPr>
         <p:spPr>
@@ -2626,7 +2835,7 @@
           </a:prstGeom>
         </p:spPr>
         <p:txBody>
-          <a:bodyPr anchorCtr="0" anchor="ctr" bIns="91425" lIns="91425" rIns="91425" tIns="91425">
+          <a:bodyPr lIns="91425" tIns="91425" rIns="91425" bIns="91425" anchor="ctr" anchorCtr="0">
             <a:noAutofit/>
           </a:bodyPr>
           <a:lstStyle/>
@@ -2641,6 +2850,7 @@
               <a:rPr lang="zh-TW"/>
               <a:t>‹#›</a:t>
             </a:fld>
+            <a:endParaRPr lang="zh-TW"/>
           </a:p>
         </p:txBody>
       </p:sp>
@@ -2653,11 +2863,11 @@
 </file>
 
 <file path=ppt/slideLayouts/slideLayout6.xml><?xml version="1.0" encoding="utf-8"?>
-<p:sldLayout xmlns:a="http://schemas.openxmlformats.org/drawingml/2006/main" xmlns:r="http://schemas.openxmlformats.org/officeDocument/2006/relationships" xmlns:mc="http://schemas.openxmlformats.org/markup-compatibility/2006" xmlns:mv="urn:schemas-microsoft-com:mac:vml" xmlns:p="http://schemas.openxmlformats.org/presentationml/2006/main" xmlns:c="http://schemas.openxmlformats.org/drawingml/2006/chart" xmlns:dgm="http://schemas.openxmlformats.org/drawingml/2006/diagram" xmlns:o="urn:schemas-microsoft-com:office:office" xmlns:v="urn:schemas-microsoft-com:vml" xmlns:pvml="urn:schemas-microsoft-com:office:powerpoint" xmlns:com="http://schemas.openxmlformats.org/drawingml/2006/compatibility" xmlns:p14="http://schemas.microsoft.com/office/powerpoint/2010/main">
+<p:sldLayout xmlns:a="http://schemas.openxmlformats.org/drawingml/2006/main" xmlns:r="http://schemas.openxmlformats.org/officeDocument/2006/relationships" xmlns:p="http://schemas.openxmlformats.org/presentationml/2006/main">
   <p:cSld name="One column text">
     <p:spTree>
       <p:nvGrpSpPr>
-        <p:cNvPr id="34" name="Shape 34"/>
+        <p:cNvPr id="1" name="Shape 34"/>
         <p:cNvGrpSpPr/>
         <p:nvPr/>
       </p:nvGrpSpPr>
@@ -2684,21 +2894,23 @@
             <a:avLst/>
           </a:prstGeom>
           <a:noFill/>
-          <a:ln cap="flat" cmpd="sng" w="38100">
+          <a:ln w="38100" cap="flat" cmpd="sng">
             <a:solidFill>
               <a:schemeClr val="accent4"/>
             </a:solidFill>
             <a:prstDash val="solid"/>
             <a:round/>
-            <a:headEnd len="med" w="med" type="none"/>
-            <a:tailEnd len="med" w="med" type="none"/>
+            <a:headEnd type="none" w="med" len="med"/>
+            <a:tailEnd type="none" w="med" len="med"/>
           </a:ln>
         </p:spPr>
       </p:cxnSp>
       <p:sp>
         <p:nvSpPr>
           <p:cNvPr id="36" name="Shape 36"/>
-          <p:cNvSpPr txBox="1"/>
+          <p:cNvSpPr txBox="1">
+            <a:spLocks noGrp="1"/>
+          </p:cNvSpPr>
           <p:nvPr>
             <p:ph type="title"/>
           </p:nvPr>
@@ -2713,7 +2925,7 @@
           </a:prstGeom>
         </p:spPr>
         <p:txBody>
-          <a:bodyPr anchorCtr="0" anchor="b" bIns="91425" lIns="91425" rIns="91425" tIns="91425"/>
+          <a:bodyPr lIns="91425" tIns="91425" rIns="91425" bIns="91425" anchor="b" anchorCtr="0"/>
           <a:lstStyle>
             <a:lvl1pPr lvl="0">
               <a:spcBef>
@@ -2779,15 +2991,19 @@
               <a:defRPr sz="2400"/>
             </a:lvl9pPr>
           </a:lstStyle>
-          <a:p/>
+          <a:p>
+            <a:endParaRPr/>
+          </a:p>
         </p:txBody>
       </p:sp>
       <p:sp>
         <p:nvSpPr>
           <p:cNvPr id="37" name="Shape 37"/>
-          <p:cNvSpPr txBox="1"/>
+          <p:cNvSpPr txBox="1">
+            <a:spLocks noGrp="1"/>
+          </p:cNvSpPr>
           <p:nvPr>
-            <p:ph idx="1" type="body"/>
+            <p:ph type="body" idx="1"/>
           </p:nvPr>
         </p:nvSpPr>
         <p:spPr>
@@ -2800,7 +3016,7 @@
           </a:prstGeom>
         </p:spPr>
         <p:txBody>
-          <a:bodyPr anchorCtr="0" anchor="t" bIns="91425" lIns="91425" rIns="91425" tIns="91425"/>
+          <a:bodyPr lIns="91425" tIns="91425" rIns="91425" bIns="91425" anchor="t" anchorCtr="0"/>
           <a:lstStyle>
             <a:lvl1pPr lvl="0">
               <a:spcBef>
@@ -2866,15 +3082,19 @@
               <a:defRPr sz="1200"/>
             </a:lvl9pPr>
           </a:lstStyle>
-          <a:p/>
+          <a:p>
+            <a:endParaRPr/>
+          </a:p>
         </p:txBody>
       </p:sp>
       <p:sp>
         <p:nvSpPr>
           <p:cNvPr id="38" name="Shape 38"/>
-          <p:cNvSpPr txBox="1"/>
+          <p:cNvSpPr txBox="1">
+            <a:spLocks noGrp="1"/>
+          </p:cNvSpPr>
           <p:nvPr>
-            <p:ph idx="12" type="sldNum"/>
+            <p:ph type="sldNum" idx="12"/>
           </p:nvPr>
         </p:nvSpPr>
         <p:spPr>
@@ -2887,7 +3107,7 @@
           </a:prstGeom>
         </p:spPr>
         <p:txBody>
-          <a:bodyPr anchorCtr="0" anchor="ctr" bIns="91425" lIns="91425" rIns="91425" tIns="91425">
+          <a:bodyPr lIns="91425" tIns="91425" rIns="91425" bIns="91425" anchor="ctr" anchorCtr="0">
             <a:noAutofit/>
           </a:bodyPr>
           <a:lstStyle/>
@@ -2902,6 +3122,7 @@
               <a:rPr lang="zh-TW"/>
               <a:t>‹#›</a:t>
             </a:fld>
+            <a:endParaRPr lang="zh-TW"/>
           </a:p>
         </p:txBody>
       </p:sp>
@@ -2914,11 +3135,11 @@
 </file>
 
 <file path=ppt/slideLayouts/slideLayout7.xml><?xml version="1.0" encoding="utf-8"?>
-<p:sldLayout xmlns:a="http://schemas.openxmlformats.org/drawingml/2006/main" xmlns:r="http://schemas.openxmlformats.org/officeDocument/2006/relationships" xmlns:mc="http://schemas.openxmlformats.org/markup-compatibility/2006" xmlns:mv="urn:schemas-microsoft-com:mac:vml" xmlns:p="http://schemas.openxmlformats.org/presentationml/2006/main" xmlns:c="http://schemas.openxmlformats.org/drawingml/2006/chart" xmlns:dgm="http://schemas.openxmlformats.org/drawingml/2006/diagram" xmlns:o="urn:schemas-microsoft-com:office:office" xmlns:v="urn:schemas-microsoft-com:vml" xmlns:pvml="urn:schemas-microsoft-com:office:powerpoint" xmlns:com="http://schemas.openxmlformats.org/drawingml/2006/compatibility" xmlns:p14="http://schemas.microsoft.com/office/powerpoint/2010/main">
+<p:sldLayout xmlns:a="http://schemas.openxmlformats.org/drawingml/2006/main" xmlns:r="http://schemas.openxmlformats.org/officeDocument/2006/relationships" xmlns:p="http://schemas.openxmlformats.org/presentationml/2006/main">
   <p:cSld name="Main point">
     <p:spTree>
       <p:nvGrpSpPr>
-        <p:cNvPr id="39" name="Shape 39"/>
+        <p:cNvPr id="1" name="Shape 39"/>
         <p:cNvGrpSpPr/>
         <p:nvPr/>
       </p:nvGrpSpPr>
@@ -2933,7 +3154,9 @@
       <p:sp>
         <p:nvSpPr>
           <p:cNvPr id="40" name="Shape 40"/>
-          <p:cNvSpPr txBox="1"/>
+          <p:cNvSpPr txBox="1">
+            <a:spLocks noGrp="1"/>
+          </p:cNvSpPr>
           <p:nvPr>
             <p:ph type="title"/>
           </p:nvPr>
@@ -2948,7 +3171,7 @@
           </a:prstGeom>
         </p:spPr>
         <p:txBody>
-          <a:bodyPr anchorCtr="0" anchor="ctr" bIns="91425" lIns="91425" rIns="91425" tIns="91425"/>
+          <a:bodyPr lIns="91425" tIns="91425" rIns="91425" bIns="91425" anchor="ctr" anchorCtr="0"/>
           <a:lstStyle>
             <a:lvl1pPr lvl="0">
               <a:spcBef>
@@ -3014,15 +3237,19 @@
               <a:defRPr sz="4800"/>
             </a:lvl9pPr>
           </a:lstStyle>
-          <a:p/>
+          <a:p>
+            <a:endParaRPr/>
+          </a:p>
         </p:txBody>
       </p:sp>
       <p:sp>
         <p:nvSpPr>
           <p:cNvPr id="41" name="Shape 41"/>
-          <p:cNvSpPr txBox="1"/>
+          <p:cNvSpPr txBox="1">
+            <a:spLocks noGrp="1"/>
+          </p:cNvSpPr>
           <p:nvPr>
-            <p:ph idx="12" type="sldNum"/>
+            <p:ph type="sldNum" idx="12"/>
           </p:nvPr>
         </p:nvSpPr>
         <p:spPr>
@@ -3035,7 +3262,7 @@
           </a:prstGeom>
         </p:spPr>
         <p:txBody>
-          <a:bodyPr anchorCtr="0" anchor="ctr" bIns="91425" lIns="91425" rIns="91425" tIns="91425">
+          <a:bodyPr lIns="91425" tIns="91425" rIns="91425" bIns="91425" anchor="ctr" anchorCtr="0">
             <a:noAutofit/>
           </a:bodyPr>
           <a:lstStyle/>
@@ -3050,6 +3277,7 @@
               <a:rPr lang="zh-TW"/>
               <a:t>‹#›</a:t>
             </a:fld>
+            <a:endParaRPr lang="zh-TW"/>
           </a:p>
         </p:txBody>
       </p:sp>
@@ -3062,11 +3290,11 @@
 </file>
 
 <file path=ppt/slideLayouts/slideLayout8.xml><?xml version="1.0" encoding="utf-8"?>
-<p:sldLayout xmlns:a="http://schemas.openxmlformats.org/drawingml/2006/main" xmlns:r="http://schemas.openxmlformats.org/officeDocument/2006/relationships" xmlns:mc="http://schemas.openxmlformats.org/markup-compatibility/2006" xmlns:mv="urn:schemas-microsoft-com:mac:vml" xmlns:p="http://schemas.openxmlformats.org/presentationml/2006/main" xmlns:c="http://schemas.openxmlformats.org/drawingml/2006/chart" xmlns:dgm="http://schemas.openxmlformats.org/drawingml/2006/diagram" xmlns:o="urn:schemas-microsoft-com:office:office" xmlns:v="urn:schemas-microsoft-com:vml" xmlns:pvml="urn:schemas-microsoft-com:office:powerpoint" xmlns:com="http://schemas.openxmlformats.org/drawingml/2006/compatibility" xmlns:p14="http://schemas.microsoft.com/office/powerpoint/2010/main">
+<p:sldLayout xmlns:a="http://schemas.openxmlformats.org/drawingml/2006/main" xmlns:r="http://schemas.openxmlformats.org/officeDocument/2006/relationships" xmlns:p="http://schemas.openxmlformats.org/presentationml/2006/main">
   <p:cSld name="Section title and description">
     <p:spTree>
       <p:nvGrpSpPr>
-        <p:cNvPr id="42" name="Shape 42"/>
+        <p:cNvPr id="1" name="Shape 42"/>
         <p:cNvGrpSpPr/>
         <p:nvPr/>
       </p:nvGrpSpPr>
@@ -3100,7 +3328,7 @@
           </a:ln>
         </p:spPr>
         <p:txBody>
-          <a:bodyPr anchorCtr="0" anchor="ctr" bIns="91425" lIns="91425" rIns="91425" tIns="91425">
+          <a:bodyPr lIns="91425" tIns="91425" rIns="91425" bIns="91425" anchor="ctr" anchorCtr="0">
             <a:noAutofit/>
           </a:bodyPr>
           <a:lstStyle/>
@@ -3111,9 +3339,6 @@
               </a:spcBef>
               <a:buNone/>
             </a:pPr>
-            <a:r>
-              <a:t/>
-            </a:r>
             <a:endParaRPr/>
           </a:p>
         </p:txBody>
@@ -3133,21 +3358,23 @@
             <a:avLst/>
           </a:prstGeom>
           <a:noFill/>
-          <a:ln cap="flat" cmpd="sng" w="38100">
+          <a:ln w="38100" cap="flat" cmpd="sng">
             <a:solidFill>
               <a:schemeClr val="accent5"/>
             </a:solidFill>
             <a:prstDash val="solid"/>
             <a:round/>
-            <a:headEnd len="med" w="med" type="none"/>
-            <a:tailEnd len="med" w="med" type="none"/>
+            <a:headEnd type="none" w="med" len="med"/>
+            <a:tailEnd type="none" w="med" len="med"/>
           </a:ln>
         </p:spPr>
       </p:cxnSp>
       <p:sp>
         <p:nvSpPr>
           <p:cNvPr id="45" name="Shape 45"/>
-          <p:cNvSpPr txBox="1"/>
+          <p:cNvSpPr txBox="1">
+            <a:spLocks noGrp="1"/>
+          </p:cNvSpPr>
           <p:nvPr>
             <p:ph type="title"/>
           </p:nvPr>
@@ -3162,7 +3389,7 @@
           </a:prstGeom>
         </p:spPr>
         <p:txBody>
-          <a:bodyPr anchorCtr="0" anchor="b" bIns="91425" lIns="91425" rIns="91425" tIns="91425"/>
+          <a:bodyPr lIns="91425" tIns="91425" rIns="91425" bIns="91425" anchor="b" anchorCtr="0"/>
           <a:lstStyle>
             <a:lvl1pPr lvl="0" algn="ctr">
               <a:spcBef>
@@ -3228,15 +3455,19 @@
               <a:defRPr sz="3800"/>
             </a:lvl9pPr>
           </a:lstStyle>
-          <a:p/>
+          <a:p>
+            <a:endParaRPr/>
+          </a:p>
         </p:txBody>
       </p:sp>
       <p:sp>
         <p:nvSpPr>
           <p:cNvPr id="46" name="Shape 46"/>
-          <p:cNvSpPr txBox="1"/>
+          <p:cNvSpPr txBox="1">
+            <a:spLocks noGrp="1"/>
+          </p:cNvSpPr>
           <p:nvPr>
-            <p:ph idx="1" type="subTitle"/>
+            <p:ph type="subTitle" idx="1"/>
           </p:nvPr>
         </p:nvSpPr>
         <p:spPr>
@@ -3249,7 +3480,7 @@
           </a:prstGeom>
         </p:spPr>
         <p:txBody>
-          <a:bodyPr anchorCtr="0" anchor="t" bIns="91425" lIns="91425" rIns="91425" tIns="91425"/>
+          <a:bodyPr lIns="91425" tIns="91425" rIns="91425" bIns="91425" anchor="t" anchorCtr="0"/>
           <a:lstStyle>
             <a:lvl1pPr lvl="0" algn="ctr">
               <a:lnSpc>
@@ -3441,15 +3672,19 @@
               </a:defRPr>
             </a:lvl9pPr>
           </a:lstStyle>
-          <a:p/>
+          <a:p>
+            <a:endParaRPr/>
+          </a:p>
         </p:txBody>
       </p:sp>
       <p:sp>
         <p:nvSpPr>
           <p:cNvPr id="47" name="Shape 47"/>
-          <p:cNvSpPr txBox="1"/>
+          <p:cNvSpPr txBox="1">
+            <a:spLocks noGrp="1"/>
+          </p:cNvSpPr>
           <p:nvPr>
-            <p:ph idx="2" type="body"/>
+            <p:ph type="body" idx="2"/>
           </p:nvPr>
         </p:nvSpPr>
         <p:spPr>
@@ -3462,7 +3697,7 @@
           </a:prstGeom>
         </p:spPr>
         <p:txBody>
-          <a:bodyPr anchorCtr="0" anchor="ctr" bIns="91425" lIns="91425" rIns="91425" tIns="91425"/>
+          <a:bodyPr lIns="91425" tIns="91425" rIns="91425" bIns="91425" anchor="ctr" anchorCtr="0"/>
           <a:lstStyle>
             <a:lvl1pPr lvl="0">
               <a:spcBef>
@@ -3519,15 +3754,19 @@
               <a:defRPr/>
             </a:lvl9pPr>
           </a:lstStyle>
-          <a:p/>
+          <a:p>
+            <a:endParaRPr/>
+          </a:p>
         </p:txBody>
       </p:sp>
       <p:sp>
         <p:nvSpPr>
           <p:cNvPr id="48" name="Shape 48"/>
-          <p:cNvSpPr txBox="1"/>
+          <p:cNvSpPr txBox="1">
+            <a:spLocks noGrp="1"/>
+          </p:cNvSpPr>
           <p:nvPr>
-            <p:ph idx="12" type="sldNum"/>
+            <p:ph type="sldNum" idx="12"/>
           </p:nvPr>
         </p:nvSpPr>
         <p:spPr>
@@ -3540,7 +3779,7 @@
           </a:prstGeom>
         </p:spPr>
         <p:txBody>
-          <a:bodyPr anchorCtr="0" anchor="ctr" bIns="91425" lIns="91425" rIns="91425" tIns="91425">
+          <a:bodyPr lIns="91425" tIns="91425" rIns="91425" bIns="91425" anchor="ctr" anchorCtr="0">
             <a:noAutofit/>
           </a:bodyPr>
           <a:lstStyle/>
@@ -3555,6 +3794,7 @@
               <a:rPr lang="zh-TW"/>
               <a:t>‹#›</a:t>
             </a:fld>
+            <a:endParaRPr lang="zh-TW"/>
           </a:p>
         </p:txBody>
       </p:sp>
@@ -3567,11 +3807,11 @@
 </file>
 
 <file path=ppt/slideLayouts/slideLayout9.xml><?xml version="1.0" encoding="utf-8"?>
-<p:sldLayout xmlns:a="http://schemas.openxmlformats.org/drawingml/2006/main" xmlns:r="http://schemas.openxmlformats.org/officeDocument/2006/relationships" xmlns:mc="http://schemas.openxmlformats.org/markup-compatibility/2006" xmlns:mv="urn:schemas-microsoft-com:mac:vml" xmlns:p="http://schemas.openxmlformats.org/presentationml/2006/main" xmlns:c="http://schemas.openxmlformats.org/drawingml/2006/chart" xmlns:dgm="http://schemas.openxmlformats.org/drawingml/2006/diagram" xmlns:o="urn:schemas-microsoft-com:office:office" xmlns:v="urn:schemas-microsoft-com:vml" xmlns:pvml="urn:schemas-microsoft-com:office:powerpoint" xmlns:com="http://schemas.openxmlformats.org/drawingml/2006/compatibility" xmlns:p14="http://schemas.microsoft.com/office/powerpoint/2010/main">
+<p:sldLayout xmlns:a="http://schemas.openxmlformats.org/drawingml/2006/main" xmlns:r="http://schemas.openxmlformats.org/officeDocument/2006/relationships" xmlns:p="http://schemas.openxmlformats.org/presentationml/2006/main">
   <p:cSld name="Caption">
     <p:spTree>
       <p:nvGrpSpPr>
-        <p:cNvPr id="49" name="Shape 49"/>
+        <p:cNvPr id="1" name="Shape 49"/>
         <p:cNvGrpSpPr/>
         <p:nvPr/>
       </p:nvGrpSpPr>
@@ -3586,9 +3826,11 @@
       <p:sp>
         <p:nvSpPr>
           <p:cNvPr id="50" name="Shape 50"/>
-          <p:cNvSpPr txBox="1"/>
+          <p:cNvSpPr txBox="1">
+            <a:spLocks noGrp="1"/>
+          </p:cNvSpPr>
           <p:nvPr>
-            <p:ph idx="1" type="body"/>
+            <p:ph type="body" idx="1"/>
           </p:nvPr>
         </p:nvSpPr>
         <p:spPr>
@@ -3601,7 +3843,7 @@
           </a:prstGeom>
         </p:spPr>
         <p:txBody>
-          <a:bodyPr anchorCtr="0" anchor="ctr" bIns="91425" lIns="91425" rIns="91425" tIns="91425"/>
+          <a:bodyPr lIns="91425" tIns="91425" rIns="91425" bIns="91425" anchor="ctr" anchorCtr="0"/>
           <a:lstStyle>
             <a:lvl1pPr lvl="0">
               <a:lnSpc>
@@ -3623,15 +3865,19 @@
               </a:defRPr>
             </a:lvl1pPr>
           </a:lstStyle>
-          <a:p/>
+          <a:p>
+            <a:endParaRPr/>
+          </a:p>
         </p:txBody>
       </p:sp>
       <p:sp>
         <p:nvSpPr>
           <p:cNvPr id="51" name="Shape 51"/>
-          <p:cNvSpPr txBox="1"/>
+          <p:cNvSpPr txBox="1">
+            <a:spLocks noGrp="1"/>
+          </p:cNvSpPr>
           <p:nvPr>
-            <p:ph idx="12" type="sldNum"/>
+            <p:ph type="sldNum" idx="12"/>
           </p:nvPr>
         </p:nvSpPr>
         <p:spPr>
@@ -3644,7 +3890,7 @@
           </a:prstGeom>
         </p:spPr>
         <p:txBody>
-          <a:bodyPr anchorCtr="0" anchor="ctr" bIns="91425" lIns="91425" rIns="91425" tIns="91425">
+          <a:bodyPr lIns="91425" tIns="91425" rIns="91425" bIns="91425" anchor="ctr" anchorCtr="0">
             <a:noAutofit/>
           </a:bodyPr>
           <a:lstStyle/>
@@ -3659,6 +3905,7 @@
               <a:rPr lang="zh-TW"/>
               <a:t>‹#›</a:t>
             </a:fld>
+            <a:endParaRPr lang="zh-TW"/>
           </a:p>
         </p:txBody>
       </p:sp>
@@ -3671,18 +3918,19 @@
 </file>
 
 <file path=ppt/slideMasters/slideMaster1.xml><?xml version="1.0" encoding="utf-8"?>
-<p:sldMaster xmlns:a="http://schemas.openxmlformats.org/drawingml/2006/main" xmlns:r="http://schemas.openxmlformats.org/officeDocument/2006/relationships" xmlns:mc="http://schemas.openxmlformats.org/markup-compatibility/2006" xmlns:mv="urn:schemas-microsoft-com:mac:vml" xmlns:p="http://schemas.openxmlformats.org/presentationml/2006/main" xmlns:c="http://schemas.openxmlformats.org/drawingml/2006/chart" xmlns:dgm="http://schemas.openxmlformats.org/drawingml/2006/diagram" xmlns:o="urn:schemas-microsoft-com:office:office" xmlns:v="urn:schemas-microsoft-com:vml" xmlns:pvml="urn:schemas-microsoft-com:office:powerpoint" xmlns:com="http://schemas.openxmlformats.org/drawingml/2006/compatibility" xmlns:p14="http://schemas.microsoft.com/office/powerpoint/2010/main">
+<p:sldMaster xmlns:a="http://schemas.openxmlformats.org/drawingml/2006/main" xmlns:r="http://schemas.openxmlformats.org/officeDocument/2006/relationships" xmlns:p="http://schemas.openxmlformats.org/presentationml/2006/main">
   <p:cSld>
     <p:bg>
       <p:bgPr>
         <a:solidFill>
           <a:schemeClr val="lt1"/>
         </a:solidFill>
+        <a:effectLst/>
       </p:bgPr>
     </p:bg>
     <p:spTree>
       <p:nvGrpSpPr>
-        <p:cNvPr id="5" name="Shape 5"/>
+        <p:cNvPr id="1" name="Shape 5"/>
         <p:cNvGrpSpPr/>
         <p:nvPr/>
       </p:nvGrpSpPr>
@@ -3697,7 +3945,9 @@
       <p:sp>
         <p:nvSpPr>
           <p:cNvPr id="6" name="Shape 6"/>
-          <p:cNvSpPr txBox="1"/>
+          <p:cNvSpPr txBox="1">
+            <a:spLocks noGrp="1"/>
+          </p:cNvSpPr>
           <p:nvPr>
             <p:ph type="title"/>
           </p:nvPr>
@@ -3716,7 +3966,7 @@
           </a:ln>
         </p:spPr>
         <p:txBody>
-          <a:bodyPr anchorCtr="0" anchor="b" bIns="91425" lIns="91425" rIns="91425" tIns="91425"/>
+          <a:bodyPr lIns="91425" tIns="91425" rIns="91425" bIns="91425" anchor="b" anchorCtr="0"/>
           <a:lstStyle>
             <a:lvl1pPr lvl="0">
               <a:spcBef>
@@ -3899,15 +4149,19 @@
               </a:defRPr>
             </a:lvl9pPr>
           </a:lstStyle>
-          <a:p/>
+          <a:p>
+            <a:endParaRPr/>
+          </a:p>
         </p:txBody>
       </p:sp>
       <p:sp>
         <p:nvSpPr>
           <p:cNvPr id="7" name="Shape 7"/>
-          <p:cNvSpPr txBox="1"/>
+          <p:cNvSpPr txBox="1">
+            <a:spLocks noGrp="1"/>
+          </p:cNvSpPr>
           <p:nvPr>
-            <p:ph idx="1" type="body"/>
+            <p:ph type="body" idx="1"/>
           </p:nvPr>
         </p:nvSpPr>
         <p:spPr>
@@ -3924,7 +4178,7 @@
           </a:ln>
         </p:spPr>
         <p:txBody>
-          <a:bodyPr anchorCtr="0" anchor="t" bIns="91425" lIns="91425" rIns="91425" tIns="91425"/>
+          <a:bodyPr lIns="91425" tIns="91425" rIns="91425" bIns="91425" anchor="t" anchorCtr="0"/>
           <a:lstStyle>
             <a:lvl1pPr lvl="0">
               <a:lnSpc>
@@ -4144,15 +4398,19 @@
               </a:defRPr>
             </a:lvl9pPr>
           </a:lstStyle>
-          <a:p/>
+          <a:p>
+            <a:endParaRPr/>
+          </a:p>
         </p:txBody>
       </p:sp>
       <p:sp>
         <p:nvSpPr>
           <p:cNvPr id="8" name="Shape 8"/>
-          <p:cNvSpPr txBox="1"/>
+          <p:cNvSpPr txBox="1">
+            <a:spLocks noGrp="1"/>
+          </p:cNvSpPr>
           <p:nvPr>
-            <p:ph idx="12" type="sldNum"/>
+            <p:ph type="sldNum" idx="12"/>
           </p:nvPr>
         </p:nvSpPr>
         <p:spPr>
@@ -4169,7 +4427,7 @@
           </a:ln>
         </p:spPr>
         <p:txBody>
-          <a:bodyPr anchorCtr="0" anchor="ctr" bIns="91425" lIns="91425" rIns="91425" tIns="91425">
+          <a:bodyPr lIns="91425" tIns="91425" rIns="91425" bIns="91425" anchor="ctr" anchorCtr="0">
             <a:noAutofit/>
           </a:bodyPr>
           <a:lstStyle/>
@@ -4192,12 +4450,21 @@
               </a:rPr>
               <a:t>‹#›</a:t>
             </a:fld>
+            <a:endParaRPr lang="zh-TW" sz="1000">
+              <a:solidFill>
+                <a:schemeClr val="dk1"/>
+              </a:solidFill>
+              <a:latin typeface="Roboto"/>
+              <a:ea typeface="Roboto"/>
+              <a:cs typeface="Roboto"/>
+              <a:sym typeface="Roboto"/>
+            </a:endParaRPr>
           </a:p>
         </p:txBody>
       </p:sp>
     </p:spTree>
   </p:cSld>
-  <p:clrMap accent1="accent1" accent2="accent2" accent3="accent3" accent4="accent4" accent5="accent5" accent6="accent6" bg1="lt1" bg2="dk2" tx1="dk1" tx2="lt2" folHlink="folHlink" hlink="hlink"/>
+  <p:clrMap bg1="lt1" tx1="dk1" bg2="dk2" tx2="lt2" accent1="accent1" accent2="accent2" accent3="accent3" accent4="accent4" accent5="accent5" accent6="accent6" hlink="hlink" folHlink="folHlink"/>
   <p:sldLayoutIdLst>
     <p:sldLayoutId id="2147483648" r:id="rId1"/>
     <p:sldLayoutId id="2147483649" r:id="rId2"/>
@@ -4211,10 +4478,10 @@
     <p:sldLayoutId id="2147483657" r:id="rId10"/>
     <p:sldLayoutId id="2147483658" r:id="rId11"/>
   </p:sldLayoutIdLst>
-  <p:hf dt="0" ftr="0" hdr="0" sldNum="0"/>
+  <p:hf sldNum="0" hdr="0" ftr="0" dt="0"/>
   <p:txStyles>
     <p:titleStyle>
-      <a:defPPr lvl="0" marR="0" rtl="0" algn="l">
+      <a:defPPr marR="0" lvl="0" algn="l" rtl="0">
         <a:lnSpc>
           <a:spcPct val="100000"/>
         </a:lnSpc>
@@ -4225,7 +4492,7 @@
           <a:spcPts val="0"/>
         </a:spcAft>
       </a:defPPr>
-      <a:lvl1pPr lvl="0" marR="0" rtl="0" algn="l">
+      <a:lvl1pPr marR="0" lvl="0" algn="l" rtl="0">
         <a:lnSpc>
           <a:spcPct val="100000"/>
         </a:lnSpc>
@@ -4236,7 +4503,7 @@
           <a:spcPts val="0"/>
         </a:spcAft>
         <a:buNone/>
-        <a:defRPr b="0" i="0" sz="1400" u="none" cap="none" strike="noStrike">
+        <a:defRPr sz="1400" b="0" i="0" u="none" strike="noStrike" cap="none">
           <a:solidFill>
             <a:srgbClr val="000000"/>
           </a:solidFill>
@@ -4248,7 +4515,7 @@
       </a:lvl1pPr>
     </p:titleStyle>
     <p:bodyStyle>
-      <a:defPPr lvl="0" marR="0" rtl="0" algn="l">
+      <a:defPPr marR="0" lvl="0" algn="l" rtl="0">
         <a:lnSpc>
           <a:spcPct val="100000"/>
         </a:lnSpc>
@@ -4259,7 +4526,7 @@
           <a:spcPts val="0"/>
         </a:spcAft>
       </a:defPPr>
-      <a:lvl1pPr lvl="0" marR="0" rtl="0" algn="l">
+      <a:lvl1pPr marR="0" lvl="0" algn="l" rtl="0">
         <a:lnSpc>
           <a:spcPct val="100000"/>
         </a:lnSpc>
@@ -4270,7 +4537,7 @@
           <a:spcPts val="0"/>
         </a:spcAft>
         <a:buNone/>
-        <a:defRPr b="0" i="0" sz="1400" u="none" cap="none" strike="noStrike">
+        <a:defRPr sz="1400" b="0" i="0" u="none" strike="noStrike" cap="none">
           <a:solidFill>
             <a:srgbClr val="000000"/>
           </a:solidFill>
@@ -4280,7 +4547,7 @@
           <a:sym typeface="Arial"/>
         </a:defRPr>
       </a:lvl1pPr>
-      <a:lvl2pPr lvl="1" marR="0" rtl="0" algn="l">
+      <a:lvl2pPr marR="0" lvl="1" algn="l" rtl="0">
         <a:lnSpc>
           <a:spcPct val="100000"/>
         </a:lnSpc>
@@ -4291,7 +4558,7 @@
           <a:spcPts val="0"/>
         </a:spcAft>
         <a:buNone/>
-        <a:defRPr b="0" i="0" sz="1400" u="none" cap="none" strike="noStrike">
+        <a:defRPr sz="1400" b="0" i="0" u="none" strike="noStrike" cap="none">
           <a:solidFill>
             <a:srgbClr val="000000"/>
           </a:solidFill>
@@ -4301,7 +4568,7 @@
           <a:sym typeface="Arial"/>
         </a:defRPr>
       </a:lvl2pPr>
-      <a:lvl3pPr lvl="2" marR="0" rtl="0" algn="l">
+      <a:lvl3pPr marR="0" lvl="2" algn="l" rtl="0">
         <a:lnSpc>
           <a:spcPct val="100000"/>
         </a:lnSpc>
@@ -4312,7 +4579,7 @@
           <a:spcPts val="0"/>
         </a:spcAft>
         <a:buNone/>
-        <a:defRPr b="0" i="0" sz="1400" u="none" cap="none" strike="noStrike">
+        <a:defRPr sz="1400" b="0" i="0" u="none" strike="noStrike" cap="none">
           <a:solidFill>
             <a:srgbClr val="000000"/>
           </a:solidFill>
@@ -4322,7 +4589,7 @@
           <a:sym typeface="Arial"/>
         </a:defRPr>
       </a:lvl3pPr>
-      <a:lvl4pPr lvl="3" marR="0" rtl="0" algn="l">
+      <a:lvl4pPr marR="0" lvl="3" algn="l" rtl="0">
         <a:lnSpc>
           <a:spcPct val="100000"/>
         </a:lnSpc>
@@ -4333,7 +4600,7 @@
           <a:spcPts val="0"/>
         </a:spcAft>
         <a:buNone/>
-        <a:defRPr b="0" i="0" sz="1400" u="none" cap="none" strike="noStrike">
+        <a:defRPr sz="1400" b="0" i="0" u="none" strike="noStrike" cap="none">
           <a:solidFill>
             <a:srgbClr val="000000"/>
           </a:solidFill>
@@ -4343,7 +4610,7 @@
           <a:sym typeface="Arial"/>
         </a:defRPr>
       </a:lvl4pPr>
-      <a:lvl5pPr lvl="4" marR="0" rtl="0" algn="l">
+      <a:lvl5pPr marR="0" lvl="4" algn="l" rtl="0">
         <a:lnSpc>
           <a:spcPct val="100000"/>
         </a:lnSpc>
@@ -4354,7 +4621,7 @@
           <a:spcPts val="0"/>
         </a:spcAft>
         <a:buNone/>
-        <a:defRPr b="0" i="0" sz="1400" u="none" cap="none" strike="noStrike">
+        <a:defRPr sz="1400" b="0" i="0" u="none" strike="noStrike" cap="none">
           <a:solidFill>
             <a:srgbClr val="000000"/>
           </a:solidFill>
@@ -4364,7 +4631,7 @@
           <a:sym typeface="Arial"/>
         </a:defRPr>
       </a:lvl5pPr>
-      <a:lvl6pPr lvl="5" marR="0" rtl="0" algn="l">
+      <a:lvl6pPr marR="0" lvl="5" algn="l" rtl="0">
         <a:lnSpc>
           <a:spcPct val="100000"/>
         </a:lnSpc>
@@ -4375,7 +4642,7 @@
           <a:spcPts val="0"/>
         </a:spcAft>
         <a:buNone/>
-        <a:defRPr b="0" i="0" sz="1400" u="none" cap="none" strike="noStrike">
+        <a:defRPr sz="1400" b="0" i="0" u="none" strike="noStrike" cap="none">
           <a:solidFill>
             <a:srgbClr val="000000"/>
           </a:solidFill>
@@ -4385,7 +4652,7 @@
           <a:sym typeface="Arial"/>
         </a:defRPr>
       </a:lvl6pPr>
-      <a:lvl7pPr lvl="6" marR="0" rtl="0" algn="l">
+      <a:lvl7pPr marR="0" lvl="6" algn="l" rtl="0">
         <a:lnSpc>
           <a:spcPct val="100000"/>
         </a:lnSpc>
@@ -4396,7 +4663,7 @@
           <a:spcPts val="0"/>
         </a:spcAft>
         <a:buNone/>
-        <a:defRPr b="0" i="0" sz="1400" u="none" cap="none" strike="noStrike">
+        <a:defRPr sz="1400" b="0" i="0" u="none" strike="noStrike" cap="none">
           <a:solidFill>
             <a:srgbClr val="000000"/>
           </a:solidFill>
@@ -4406,7 +4673,7 @@
           <a:sym typeface="Arial"/>
         </a:defRPr>
       </a:lvl7pPr>
-      <a:lvl8pPr lvl="7" marR="0" rtl="0" algn="l">
+      <a:lvl8pPr marR="0" lvl="7" algn="l" rtl="0">
         <a:lnSpc>
           <a:spcPct val="100000"/>
         </a:lnSpc>
@@ -4417,7 +4684,7 @@
           <a:spcPts val="0"/>
         </a:spcAft>
         <a:buNone/>
-        <a:defRPr b="0" i="0" sz="1400" u="none" cap="none" strike="noStrike">
+        <a:defRPr sz="1400" b="0" i="0" u="none" strike="noStrike" cap="none">
           <a:solidFill>
             <a:srgbClr val="000000"/>
           </a:solidFill>
@@ -4427,7 +4694,7 @@
           <a:sym typeface="Arial"/>
         </a:defRPr>
       </a:lvl8pPr>
-      <a:lvl9pPr lvl="8" marR="0" rtl="0" algn="l">
+      <a:lvl9pPr marR="0" lvl="8" algn="l" rtl="0">
         <a:lnSpc>
           <a:spcPct val="100000"/>
         </a:lnSpc>
@@ -4438,7 +4705,7 @@
           <a:spcPts val="0"/>
         </a:spcAft>
         <a:buNone/>
-        <a:defRPr b="0" i="0" sz="1400" u="none" cap="none" strike="noStrike">
+        <a:defRPr sz="1400" b="0" i="0" u="none" strike="noStrike" cap="none">
           <a:solidFill>
             <a:srgbClr val="000000"/>
           </a:solidFill>
@@ -4450,7 +4717,7 @@
       </a:lvl9pPr>
     </p:bodyStyle>
     <p:otherStyle>
-      <a:defPPr lvl="0" marR="0" rtl="0" algn="l">
+      <a:defPPr marR="0" lvl="0" algn="l" rtl="0">
         <a:lnSpc>
           <a:spcPct val="100000"/>
         </a:lnSpc>
@@ -4461,7 +4728,7 @@
           <a:spcPts val="0"/>
         </a:spcAft>
       </a:defPPr>
-      <a:lvl1pPr lvl="0" marR="0" rtl="0" algn="l">
+      <a:lvl1pPr marR="0" lvl="0" algn="l" rtl="0">
         <a:lnSpc>
           <a:spcPct val="100000"/>
         </a:lnSpc>
@@ -4472,7 +4739,7 @@
           <a:spcPts val="0"/>
         </a:spcAft>
         <a:buNone/>
-        <a:defRPr b="0" i="0" sz="1400" u="none" cap="none" strike="noStrike">
+        <a:defRPr sz="1400" b="0" i="0" u="none" strike="noStrike" cap="none">
           <a:solidFill>
             <a:srgbClr val="000000"/>
           </a:solidFill>
@@ -4482,7 +4749,7 @@
           <a:sym typeface="Arial"/>
         </a:defRPr>
       </a:lvl1pPr>
-      <a:lvl2pPr lvl="1" marR="0" rtl="0" algn="l">
+      <a:lvl2pPr marR="0" lvl="1" algn="l" rtl="0">
         <a:lnSpc>
           <a:spcPct val="100000"/>
         </a:lnSpc>
@@ -4493,7 +4760,7 @@
           <a:spcPts val="0"/>
         </a:spcAft>
         <a:buNone/>
-        <a:defRPr b="0" i="0" sz="1400" u="none" cap="none" strike="noStrike">
+        <a:defRPr sz="1400" b="0" i="0" u="none" strike="noStrike" cap="none">
           <a:solidFill>
             <a:srgbClr val="000000"/>
           </a:solidFill>
@@ -4503,7 +4770,7 @@
           <a:sym typeface="Arial"/>
         </a:defRPr>
       </a:lvl2pPr>
-      <a:lvl3pPr lvl="2" marR="0" rtl="0" algn="l">
+      <a:lvl3pPr marR="0" lvl="2" algn="l" rtl="0">
         <a:lnSpc>
           <a:spcPct val="100000"/>
         </a:lnSpc>
@@ -4514,7 +4781,7 @@
           <a:spcPts val="0"/>
         </a:spcAft>
         <a:buNone/>
-        <a:defRPr b="0" i="0" sz="1400" u="none" cap="none" strike="noStrike">
+        <a:defRPr sz="1400" b="0" i="0" u="none" strike="noStrike" cap="none">
           <a:solidFill>
             <a:srgbClr val="000000"/>
           </a:solidFill>
@@ -4524,7 +4791,7 @@
           <a:sym typeface="Arial"/>
         </a:defRPr>
       </a:lvl3pPr>
-      <a:lvl4pPr lvl="3" marR="0" rtl="0" algn="l">
+      <a:lvl4pPr marR="0" lvl="3" algn="l" rtl="0">
         <a:lnSpc>
           <a:spcPct val="100000"/>
         </a:lnSpc>
@@ -4535,7 +4802,7 @@
           <a:spcPts val="0"/>
         </a:spcAft>
         <a:buNone/>
-        <a:defRPr b="0" i="0" sz="1400" u="none" cap="none" strike="noStrike">
+        <a:defRPr sz="1400" b="0" i="0" u="none" strike="noStrike" cap="none">
           <a:solidFill>
             <a:srgbClr val="000000"/>
           </a:solidFill>
@@ -4545,7 +4812,7 @@
           <a:sym typeface="Arial"/>
         </a:defRPr>
       </a:lvl4pPr>
-      <a:lvl5pPr lvl="4" marR="0" rtl="0" algn="l">
+      <a:lvl5pPr marR="0" lvl="4" algn="l" rtl="0">
         <a:lnSpc>
           <a:spcPct val="100000"/>
         </a:lnSpc>
@@ -4556,7 +4823,7 @@
           <a:spcPts val="0"/>
         </a:spcAft>
         <a:buNone/>
-        <a:defRPr b="0" i="0" sz="1400" u="none" cap="none" strike="noStrike">
+        <a:defRPr sz="1400" b="0" i="0" u="none" strike="noStrike" cap="none">
           <a:solidFill>
             <a:srgbClr val="000000"/>
           </a:solidFill>
@@ -4566,7 +4833,7 @@
           <a:sym typeface="Arial"/>
         </a:defRPr>
       </a:lvl5pPr>
-      <a:lvl6pPr lvl="5" marR="0" rtl="0" algn="l">
+      <a:lvl6pPr marR="0" lvl="5" algn="l" rtl="0">
         <a:lnSpc>
           <a:spcPct val="100000"/>
         </a:lnSpc>
@@ -4577,7 +4844,7 @@
           <a:spcPts val="0"/>
         </a:spcAft>
         <a:buNone/>
-        <a:defRPr b="0" i="0" sz="1400" u="none" cap="none" strike="noStrike">
+        <a:defRPr sz="1400" b="0" i="0" u="none" strike="noStrike" cap="none">
           <a:solidFill>
             <a:srgbClr val="000000"/>
           </a:solidFill>
@@ -4587,7 +4854,7 @@
           <a:sym typeface="Arial"/>
         </a:defRPr>
       </a:lvl6pPr>
-      <a:lvl7pPr lvl="6" marR="0" rtl="0" algn="l">
+      <a:lvl7pPr marR="0" lvl="6" algn="l" rtl="0">
         <a:lnSpc>
           <a:spcPct val="100000"/>
         </a:lnSpc>
@@ -4598,7 +4865,7 @@
           <a:spcPts val="0"/>
         </a:spcAft>
         <a:buNone/>
-        <a:defRPr b="0" i="0" sz="1400" u="none" cap="none" strike="noStrike">
+        <a:defRPr sz="1400" b="0" i="0" u="none" strike="noStrike" cap="none">
           <a:solidFill>
             <a:srgbClr val="000000"/>
           </a:solidFill>
@@ -4608,7 +4875,7 @@
           <a:sym typeface="Arial"/>
         </a:defRPr>
       </a:lvl7pPr>
-      <a:lvl8pPr lvl="7" marR="0" rtl="0" algn="l">
+      <a:lvl8pPr marR="0" lvl="7" algn="l" rtl="0">
         <a:lnSpc>
           <a:spcPct val="100000"/>
         </a:lnSpc>
@@ -4619,7 +4886,7 @@
           <a:spcPts val="0"/>
         </a:spcAft>
         <a:buNone/>
-        <a:defRPr b="0" i="0" sz="1400" u="none" cap="none" strike="noStrike">
+        <a:defRPr sz="1400" b="0" i="0" u="none" strike="noStrike" cap="none">
           <a:solidFill>
             <a:srgbClr val="000000"/>
           </a:solidFill>
@@ -4629,7 +4896,7 @@
           <a:sym typeface="Arial"/>
         </a:defRPr>
       </a:lvl8pPr>
-      <a:lvl9pPr lvl="8" marR="0" rtl="0" algn="l">
+      <a:lvl9pPr marR="0" lvl="8" algn="l" rtl="0">
         <a:lnSpc>
           <a:spcPct val="100000"/>
         </a:lnSpc>
@@ -4640,7 +4907,7 @@
           <a:spcPts val="0"/>
         </a:spcAft>
         <a:buNone/>
-        <a:defRPr b="0" i="0" sz="1400" u="none" cap="none" strike="noStrike">
+        <a:defRPr sz="1400" b="0" i="0" u="none" strike="noStrike" cap="none">
           <a:solidFill>
             <a:srgbClr val="000000"/>
           </a:solidFill>
@@ -4656,11 +4923,11 @@
 </file>
 
 <file path=ppt/slides/slide1.xml><?xml version="1.0" encoding="utf-8"?>
-<p:sld xmlns:a="http://schemas.openxmlformats.org/drawingml/2006/main" xmlns:r="http://schemas.openxmlformats.org/officeDocument/2006/relationships" xmlns:mc="http://schemas.openxmlformats.org/markup-compatibility/2006" xmlns:mv="urn:schemas-microsoft-com:mac:vml" xmlns:p="http://schemas.openxmlformats.org/presentationml/2006/main" xmlns:c="http://schemas.openxmlformats.org/drawingml/2006/chart" xmlns:dgm="http://schemas.openxmlformats.org/drawingml/2006/diagram" xmlns:o="urn:schemas-microsoft-com:office:office" xmlns:v="urn:schemas-microsoft-com:vml" xmlns:pvml="urn:schemas-microsoft-com:office:powerpoint" xmlns:com="http://schemas.openxmlformats.org/drawingml/2006/compatibility" xmlns:p14="http://schemas.microsoft.com/office/powerpoint/2010/main">
+<p:sld xmlns:a="http://schemas.openxmlformats.org/drawingml/2006/main" xmlns:r="http://schemas.openxmlformats.org/officeDocument/2006/relationships" xmlns:p="http://schemas.openxmlformats.org/presentationml/2006/main">
   <p:cSld>
     <p:spTree>
       <p:nvGrpSpPr>
-        <p:cNvPr id="62" name="Shape 62"/>
+        <p:cNvPr id="1" name="Shape 62"/>
         <p:cNvGrpSpPr/>
         <p:nvPr/>
       </p:nvGrpSpPr>
@@ -4675,7 +4942,9 @@
       <p:sp>
         <p:nvSpPr>
           <p:cNvPr id="63" name="Shape 63"/>
-          <p:cNvSpPr txBox="1"/>
+          <p:cNvSpPr txBox="1">
+            <a:spLocks noGrp="1"/>
+          </p:cNvSpPr>
           <p:nvPr>
             <p:ph type="ctrTitle"/>
           </p:nvPr>
@@ -4690,7 +4959,7 @@
           </a:prstGeom>
         </p:spPr>
         <p:txBody>
-          <a:bodyPr anchorCtr="0" anchor="b" bIns="91425" lIns="91425" rIns="91425" tIns="91425">
+          <a:bodyPr lIns="91425" tIns="91425" rIns="91425" bIns="91425" anchor="b" anchorCtr="0">
             <a:noAutofit/>
           </a:bodyPr>
           <a:lstStyle/>
@@ -4723,9 +4992,11 @@
       <p:sp>
         <p:nvSpPr>
           <p:cNvPr id="64" name="Shape 64"/>
-          <p:cNvSpPr txBox="1"/>
+          <p:cNvSpPr txBox="1">
+            <a:spLocks noGrp="1"/>
+          </p:cNvSpPr>
           <p:nvPr>
-            <p:ph idx="1" type="subTitle"/>
+            <p:ph type="subTitle" idx="1"/>
           </p:nvPr>
         </p:nvSpPr>
         <p:spPr>
@@ -4738,7 +5009,7 @@
           </a:prstGeom>
         </p:spPr>
         <p:txBody>
-          <a:bodyPr anchorCtr="0" anchor="t" bIns="91425" lIns="91425" rIns="91425" tIns="91425">
+          <a:bodyPr lIns="91425" tIns="91425" rIns="91425" bIns="91425" anchor="t" anchorCtr="0">
             <a:noAutofit/>
           </a:bodyPr>
           <a:lstStyle/>
@@ -4758,7 +5029,7 @@
       </p:sp>
       <p:pic>
         <p:nvPicPr>
-          <p:cNvPr descr="by-nc-sa.png" id="65" name="Shape 65"/>
+          <p:cNvPr id="65" name="Shape 65" descr="by-nc-sa.png"/>
           <p:cNvPicPr preferRelativeResize="0"/>
           <p:nvPr/>
         </p:nvPicPr>
@@ -4804,7 +5075,7 @@
           </a:ln>
         </p:spPr>
         <p:txBody>
-          <a:bodyPr anchorCtr="0" anchor="t" bIns="91425" lIns="91425" rIns="91425" tIns="91425">
+          <a:bodyPr lIns="91425" tIns="91425" rIns="91425" bIns="91425" anchor="t" anchorCtr="0">
             <a:noAutofit/>
           </a:bodyPr>
           <a:lstStyle/>
@@ -4872,11 +5143,11 @@
 </file>
 
 <file path=ppt/slides/slide2.xml><?xml version="1.0" encoding="utf-8"?>
-<p:sld xmlns:a="http://schemas.openxmlformats.org/drawingml/2006/main" xmlns:r="http://schemas.openxmlformats.org/officeDocument/2006/relationships" xmlns:mc="http://schemas.openxmlformats.org/markup-compatibility/2006" xmlns:mv="urn:schemas-microsoft-com:mac:vml" xmlns:p="http://schemas.openxmlformats.org/presentationml/2006/main" xmlns:c="http://schemas.openxmlformats.org/drawingml/2006/chart" xmlns:dgm="http://schemas.openxmlformats.org/drawingml/2006/diagram" xmlns:o="urn:schemas-microsoft-com:office:office" xmlns:v="urn:schemas-microsoft-com:vml" xmlns:pvml="urn:schemas-microsoft-com:office:powerpoint" xmlns:com="http://schemas.openxmlformats.org/drawingml/2006/compatibility" xmlns:p14="http://schemas.microsoft.com/office/powerpoint/2010/main">
+<p:sld xmlns:a="http://schemas.openxmlformats.org/drawingml/2006/main" xmlns:r="http://schemas.openxmlformats.org/officeDocument/2006/relationships" xmlns:p="http://schemas.openxmlformats.org/presentationml/2006/main">
   <p:cSld>
     <p:spTree>
       <p:nvGrpSpPr>
-        <p:cNvPr id="70" name="Shape 70"/>
+        <p:cNvPr id="1" name="Shape 70"/>
         <p:cNvGrpSpPr/>
         <p:nvPr/>
       </p:nvGrpSpPr>
@@ -4891,7 +5162,9 @@
       <p:sp>
         <p:nvSpPr>
           <p:cNvPr id="71" name="Shape 71"/>
-          <p:cNvSpPr txBox="1"/>
+          <p:cNvSpPr txBox="1">
+            <a:spLocks noGrp="1"/>
+          </p:cNvSpPr>
           <p:nvPr>
             <p:ph type="title"/>
           </p:nvPr>
@@ -4906,7 +5179,7 @@
           </a:prstGeom>
         </p:spPr>
         <p:txBody>
-          <a:bodyPr anchorCtr="0" anchor="b" bIns="91425" lIns="91425" rIns="91425" tIns="91425">
+          <a:bodyPr lIns="91425" tIns="91425" rIns="91425" bIns="91425" anchor="b" anchorCtr="0">
             <a:noAutofit/>
           </a:bodyPr>
           <a:lstStyle/>
@@ -4927,9 +5200,11 @@
       <p:sp>
         <p:nvSpPr>
           <p:cNvPr id="72" name="Shape 72"/>
-          <p:cNvSpPr txBox="1"/>
+          <p:cNvSpPr txBox="1">
+            <a:spLocks noGrp="1"/>
+          </p:cNvSpPr>
           <p:nvPr>
-            <p:ph idx="1" type="body"/>
+            <p:ph type="body" idx="1"/>
           </p:nvPr>
         </p:nvSpPr>
         <p:spPr>
@@ -4942,12 +5217,12 @@
           </a:prstGeom>
         </p:spPr>
         <p:txBody>
-          <a:bodyPr anchorCtr="0" anchor="t" bIns="91425" lIns="91425" rIns="91425" tIns="91425">
+          <a:bodyPr lIns="91425" tIns="91425" rIns="91425" bIns="91425" anchor="t" anchorCtr="0">
             <a:noAutofit/>
           </a:bodyPr>
           <a:lstStyle/>
           <a:p>
-            <a:pPr indent="-228600" lvl="0" marL="457200" rtl="0">
+            <a:pPr marL="457200" lvl="0" indent="-228600" rtl="0">
               <a:spcBef>
                 <a:spcPts val="0"/>
               </a:spcBef>
@@ -4958,7 +5233,7 @@
             </a:r>
           </a:p>
           <a:p>
-            <a:pPr indent="-228600" lvl="1" marL="914400" rtl="0">
+            <a:pPr marL="914400" lvl="1" indent="-228600" rtl="0">
               <a:spcBef>
                 <a:spcPts val="0"/>
               </a:spcBef>
@@ -4969,7 +5244,7 @@
             </a:r>
           </a:p>
           <a:p>
-            <a:pPr indent="-228600" lvl="0" marL="457200" rtl="0">
+            <a:pPr marL="457200" lvl="0" indent="-228600" rtl="0">
               <a:spcBef>
                 <a:spcPts val="0"/>
               </a:spcBef>
@@ -4980,7 +5255,7 @@
             </a:r>
           </a:p>
           <a:p>
-            <a:pPr indent="-228600" lvl="1" marL="914400" rtl="0">
+            <a:pPr marL="914400" lvl="1" indent="-228600" rtl="0">
               <a:spcBef>
                 <a:spcPts val="0"/>
               </a:spcBef>
@@ -4991,7 +5266,7 @@
             </a:r>
           </a:p>
           <a:p>
-            <a:pPr indent="-228600" lvl="2" marL="1371600" rtl="0">
+            <a:pPr marL="1371600" lvl="2" indent="-228600" rtl="0">
               <a:spcBef>
                 <a:spcPts val="0"/>
               </a:spcBef>
@@ -5002,7 +5277,7 @@
             </a:r>
           </a:p>
           <a:p>
-            <a:pPr indent="-228600" lvl="2" marL="1371600" rtl="0">
+            <a:pPr marL="1371600" lvl="2" indent="-228600" rtl="0">
               <a:spcBef>
                 <a:spcPts val="0"/>
               </a:spcBef>
@@ -5013,7 +5288,7 @@
             </a:r>
           </a:p>
           <a:p>
-            <a:pPr indent="-228600" lvl="1" marL="914400" rtl="0">
+            <a:pPr marL="914400" lvl="1" indent="-228600" rtl="0">
               <a:spcBef>
                 <a:spcPts val="0"/>
               </a:spcBef>
@@ -5024,7 +5299,7 @@
             </a:r>
           </a:p>
           <a:p>
-            <a:pPr indent="-228600" lvl="2" marL="1371600" rtl="0">
+            <a:pPr marL="1371600" lvl="2" indent="-228600" rtl="0">
               <a:spcBef>
                 <a:spcPts val="0"/>
               </a:spcBef>
@@ -5035,7 +5310,7 @@
             </a:r>
           </a:p>
           <a:p>
-            <a:pPr indent="-228600" lvl="2" marL="1371600">
+            <a:pPr marL="1371600" lvl="2" indent="-228600">
               <a:spcBef>
                 <a:spcPts val="0"/>
               </a:spcBef>
@@ -5056,11 +5331,11 @@
 </file>
 
 <file path=ppt/slides/slide3.xml><?xml version="1.0" encoding="utf-8"?>
-<p:sld xmlns:a="http://schemas.openxmlformats.org/drawingml/2006/main" xmlns:r="http://schemas.openxmlformats.org/officeDocument/2006/relationships" xmlns:mc="http://schemas.openxmlformats.org/markup-compatibility/2006" xmlns:mv="urn:schemas-microsoft-com:mac:vml" xmlns:p="http://schemas.openxmlformats.org/presentationml/2006/main" xmlns:c="http://schemas.openxmlformats.org/drawingml/2006/chart" xmlns:dgm="http://schemas.openxmlformats.org/drawingml/2006/diagram" xmlns:o="urn:schemas-microsoft-com:office:office" xmlns:v="urn:schemas-microsoft-com:vml" xmlns:pvml="urn:schemas-microsoft-com:office:powerpoint" xmlns:com="http://schemas.openxmlformats.org/drawingml/2006/compatibility" xmlns:p14="http://schemas.microsoft.com/office/powerpoint/2010/main">
+<p:sld xmlns:a="http://schemas.openxmlformats.org/drawingml/2006/main" xmlns:r="http://schemas.openxmlformats.org/officeDocument/2006/relationships" xmlns:p="http://schemas.openxmlformats.org/presentationml/2006/main">
   <p:cSld>
     <p:spTree>
       <p:nvGrpSpPr>
-        <p:cNvPr id="76" name="Shape 76"/>
+        <p:cNvPr id="1" name="Shape 76"/>
         <p:cNvGrpSpPr/>
         <p:nvPr/>
       </p:nvGrpSpPr>
@@ -5075,7 +5350,9 @@
       <p:sp>
         <p:nvSpPr>
           <p:cNvPr id="77" name="Shape 77"/>
-          <p:cNvSpPr txBox="1"/>
+          <p:cNvSpPr txBox="1">
+            <a:spLocks noGrp="1"/>
+          </p:cNvSpPr>
           <p:nvPr>
             <p:ph type="title"/>
           </p:nvPr>
@@ -5090,7 +5367,7 @@
           </a:prstGeom>
         </p:spPr>
         <p:txBody>
-          <a:bodyPr anchorCtr="0" anchor="b" bIns="91425" lIns="91425" rIns="91425" tIns="91425">
+          <a:bodyPr lIns="91425" tIns="91425" rIns="91425" bIns="91425" anchor="b" anchorCtr="0">
             <a:noAutofit/>
           </a:bodyPr>
           <a:lstStyle/>
@@ -5111,9 +5388,11 @@
       <p:sp>
         <p:nvSpPr>
           <p:cNvPr id="78" name="Shape 78"/>
-          <p:cNvSpPr txBox="1"/>
+          <p:cNvSpPr txBox="1">
+            <a:spLocks noGrp="1"/>
+          </p:cNvSpPr>
           <p:nvPr>
-            <p:ph idx="1" type="body"/>
+            <p:ph type="body" idx="1"/>
           </p:nvPr>
         </p:nvSpPr>
         <p:spPr>
@@ -5126,106 +5405,136 @@
           </a:prstGeom>
         </p:spPr>
         <p:txBody>
-          <a:bodyPr anchorCtr="0" anchor="t" bIns="91425" lIns="91425" rIns="91425" tIns="91425">
+          <a:bodyPr lIns="91425" tIns="91425" rIns="91425" bIns="91425" anchor="t" anchorCtr="0">
             <a:noAutofit/>
           </a:bodyPr>
           <a:lstStyle/>
           <a:p>
-            <a:pPr indent="-228600" lvl="0" marL="457200" rtl="0">
+            <a:pPr marL="457200" lvl="0" indent="-228600" rtl="0">
               <a:spcBef>
                 <a:spcPts val="0"/>
               </a:spcBef>
             </a:pPr>
             <a:r>
-              <a:rPr lang="zh-TW"/>
+              <a:rPr lang="zh-TW" dirty="0"/>
               <a:t>實驗目的</a:t>
             </a:r>
           </a:p>
           <a:p>
-            <a:pPr indent="-228600" lvl="1" marL="914400" rtl="0">
+            <a:pPr marL="914400" lvl="1" indent="-228600" rtl="0">
               <a:spcBef>
                 <a:spcPts val="0"/>
               </a:spcBef>
             </a:pPr>
             <a:r>
-              <a:rPr lang="zh-TW"/>
+              <a:rPr lang="zh-TW" dirty="0"/>
               <a:t>瞭解並應用二維陣列</a:t>
             </a:r>
           </a:p>
           <a:p>
-            <a:pPr indent="-228600" lvl="0" marL="457200" rtl="0">
+            <a:pPr marL="457200" lvl="0" indent="-228600" rtl="0">
               <a:spcBef>
                 <a:spcPts val="0"/>
               </a:spcBef>
             </a:pPr>
             <a:r>
-              <a:rPr lang="zh-TW"/>
+              <a:rPr lang="zh-TW" dirty="0"/>
               <a:t>實驗檢查項目</a:t>
             </a:r>
           </a:p>
           <a:p>
-            <a:pPr indent="-228600" lvl="1" marL="914400" rtl="0">
+            <a:pPr marL="914400" lvl="1" indent="-228600" rtl="0">
               <a:spcBef>
                 <a:spcPts val="0"/>
               </a:spcBef>
             </a:pPr>
             <a:r>
-              <a:rPr lang="zh-TW"/>
+              <a:rPr lang="zh-TW" dirty="0"/>
               <a:t>n x n 矩陣乘法</a:t>
             </a:r>
           </a:p>
           <a:p>
-            <a:pPr indent="-228600" lvl="2" marL="1371600" rtl="0">
+            <a:pPr marL="1371600" lvl="2" indent="-228600" rtl="0">
               <a:spcBef>
                 <a:spcPts val="0"/>
               </a:spcBef>
             </a:pPr>
             <a:r>
-              <a:rPr lang="zh-TW"/>
-              <a:t>輸入：方矩陣 n, m</a:t>
+              <a:rPr lang="zh-TW" dirty="0"/>
+              <a:t>輸入：方矩陣 </a:t>
             </a:r>
-          </a:p>
-          <a:p>
-            <a:pPr indent="-228600" lvl="2" marL="1371600" rtl="0">
+            <a:r>
+              <a:rPr lang="en-US" altLang="zh-TW" dirty="0"/>
+              <a:t>A</a:t>
+            </a:r>
+            <a:r>
+              <a:rPr lang="zh-TW" dirty="0"/>
+              <a:t>, </a:t>
+            </a:r>
+            <a:r>
+              <a:rPr lang="en-US" altLang="zh-TW" dirty="0"/>
+              <a:t>B</a:t>
+            </a:r>
+            <a:endParaRPr lang="zh-TW" dirty="0"/>
+          </a:p>
+          <a:p>
+            <a:pPr marL="1371600" lvl="2" indent="-228600" rtl="0">
               <a:spcBef>
                 <a:spcPts val="0"/>
               </a:spcBef>
             </a:pPr>
             <a:r>
+              <a:rPr lang="zh-TW" dirty="0"/>
+              <a:t>輸出：</a:t>
+            </a:r>
+            <a:r>
+              <a:rPr lang="en-US" altLang="zh-TW"/>
+              <a:t>A</a:t>
+            </a:r>
+            <a:r>
               <a:rPr lang="zh-TW"/>
-              <a:t>輸出：n x m</a:t>
+              <a:t> </a:t>
             </a:r>
-          </a:p>
-          <a:p>
-            <a:pPr indent="-228600" lvl="1" marL="914400" rtl="0">
+            <a:r>
+              <a:rPr lang="zh-TW" dirty="0"/>
+              <a:t>x </a:t>
+            </a:r>
+            <a:r>
+              <a:rPr lang="en-US" altLang="zh-TW" dirty="0"/>
+              <a:t>B</a:t>
+            </a:r>
+            <a:endParaRPr lang="zh-TW" dirty="0"/>
+          </a:p>
+          <a:p>
+            <a:pPr marL="914400" lvl="1" indent="-228600" rtl="0">
               <a:spcBef>
                 <a:spcPts val="0"/>
               </a:spcBef>
             </a:pPr>
             <a:r>
-              <a:rPr lang="zh-TW"/>
+              <a:rPr lang="zh-TW" dirty="0"/>
               <a:t>反矩陣</a:t>
             </a:r>
           </a:p>
           <a:p>
-            <a:pPr indent="-228600" lvl="2" marL="1371600" rtl="0">
+            <a:pPr marL="1371600" lvl="2" indent="-228600" rtl="0">
               <a:spcBef>
                 <a:spcPts val="0"/>
               </a:spcBef>
             </a:pPr>
             <a:r>
-              <a:rPr lang="zh-TW"/>
+              <a:rPr lang="zh-TW" dirty="0"/>
               <a:t>輸入：矩陣 n（邊長 &lt; 100，不一定等長）</a:t>
             </a:r>
           </a:p>
           <a:p>
-            <a:pPr indent="-228600" lvl="2" marL="1371600">
+            <a:pPr marL="1371600" lvl="2" indent="-228600">
               <a:spcBef>
                 <a:spcPts val="0"/>
               </a:spcBef>
             </a:pPr>
             <a:r>
-              <a:rPr lang="zh-TW"/>
+              <a:rPr lang="zh-TW" dirty="0"/>
               <a:t>輸出：n 的反矩陣</a:t>
             </a:r>
           </a:p>
@@ -5240,11 +5549,11 @@
 </file>
 
 <file path=ppt/slides/slide4.xml><?xml version="1.0" encoding="utf-8"?>
-<p:sld xmlns:a="http://schemas.openxmlformats.org/drawingml/2006/main" xmlns:r="http://schemas.openxmlformats.org/officeDocument/2006/relationships" xmlns:mc="http://schemas.openxmlformats.org/markup-compatibility/2006" xmlns:mv="urn:schemas-microsoft-com:mac:vml" xmlns:p="http://schemas.openxmlformats.org/presentationml/2006/main" xmlns:c="http://schemas.openxmlformats.org/drawingml/2006/chart" xmlns:dgm="http://schemas.openxmlformats.org/drawingml/2006/diagram" xmlns:o="urn:schemas-microsoft-com:office:office" xmlns:v="urn:schemas-microsoft-com:vml" xmlns:pvml="urn:schemas-microsoft-com:office:powerpoint" xmlns:com="http://schemas.openxmlformats.org/drawingml/2006/compatibility" xmlns:p14="http://schemas.microsoft.com/office/powerpoint/2010/main">
+<p:sld xmlns:a="http://schemas.openxmlformats.org/drawingml/2006/main" xmlns:r="http://schemas.openxmlformats.org/officeDocument/2006/relationships" xmlns:p="http://schemas.openxmlformats.org/presentationml/2006/main">
   <p:cSld>
     <p:spTree>
       <p:nvGrpSpPr>
-        <p:cNvPr id="82" name="Shape 82"/>
+        <p:cNvPr id="1" name="Shape 82"/>
         <p:cNvGrpSpPr/>
         <p:nvPr/>
       </p:nvGrpSpPr>
@@ -5259,7 +5568,9 @@
       <p:sp>
         <p:nvSpPr>
           <p:cNvPr id="83" name="Shape 83"/>
-          <p:cNvSpPr txBox="1"/>
+          <p:cNvSpPr txBox="1">
+            <a:spLocks noGrp="1"/>
+          </p:cNvSpPr>
           <p:nvPr>
             <p:ph type="title"/>
           </p:nvPr>
@@ -5274,7 +5585,7 @@
           </a:prstGeom>
         </p:spPr>
         <p:txBody>
-          <a:bodyPr anchorCtr="0" anchor="b" bIns="91425" lIns="91425" rIns="91425" tIns="91425">
+          <a:bodyPr lIns="91425" tIns="91425" rIns="91425" bIns="91425" anchor="b" anchorCtr="0">
             <a:noAutofit/>
           </a:bodyPr>
           <a:lstStyle/>
@@ -5295,9 +5606,11 @@
       <p:sp>
         <p:nvSpPr>
           <p:cNvPr id="84" name="Shape 84"/>
-          <p:cNvSpPr txBox="1"/>
+          <p:cNvSpPr txBox="1">
+            <a:spLocks noGrp="1"/>
+          </p:cNvSpPr>
           <p:nvPr>
-            <p:ph idx="1" type="body"/>
+            <p:ph type="body" idx="1"/>
           </p:nvPr>
         </p:nvSpPr>
         <p:spPr>
@@ -5310,12 +5623,12 @@
           </a:prstGeom>
         </p:spPr>
         <p:txBody>
-          <a:bodyPr anchorCtr="0" anchor="t" bIns="91425" lIns="91425" rIns="91425" tIns="91425">
+          <a:bodyPr lIns="91425" tIns="91425" rIns="91425" bIns="91425" anchor="t" anchorCtr="0">
             <a:noAutofit/>
           </a:bodyPr>
           <a:lstStyle/>
           <a:p>
-            <a:pPr indent="-228600" lvl="0" marL="457200" rtl="0">
+            <a:pPr marL="457200" lvl="0" indent="-228600" rtl="0">
               <a:spcBef>
                 <a:spcPts val="0"/>
               </a:spcBef>
@@ -5326,7 +5639,7 @@
             </a:r>
           </a:p>
           <a:p>
-            <a:pPr indent="-228600" lvl="1" marL="914400" rtl="0">
+            <a:pPr marL="914400" lvl="1" indent="-228600" rtl="0">
               <a:spcBef>
                 <a:spcPts val="0"/>
               </a:spcBef>
@@ -5337,7 +5650,7 @@
             </a:r>
           </a:p>
           <a:p>
-            <a:pPr indent="-228600" lvl="1" marL="914400" rtl="0">
+            <a:pPr marL="914400" lvl="1" indent="-228600" rtl="0">
               <a:spcBef>
                 <a:spcPts val="0"/>
               </a:spcBef>
@@ -5348,7 +5661,7 @@
             </a:r>
           </a:p>
           <a:p>
-            <a:pPr indent="-228600" lvl="0" marL="457200" rtl="0">
+            <a:pPr marL="457200" lvl="0" indent="-228600" rtl="0">
               <a:spcBef>
                 <a:spcPts val="0"/>
               </a:spcBef>
@@ -5359,7 +5672,7 @@
             </a:r>
           </a:p>
           <a:p>
-            <a:pPr indent="-228600" lvl="1" marL="914400" rtl="0">
+            <a:pPr marL="914400" lvl="1" indent="-228600" rtl="0">
               <a:spcBef>
                 <a:spcPts val="0"/>
               </a:spcBef>
@@ -5370,7 +5683,7 @@
             </a:r>
           </a:p>
           <a:p>
-            <a:pPr indent="-228600" lvl="2" marL="1371600" rtl="0">
+            <a:pPr marL="1371600" lvl="2" indent="-228600" rtl="0">
               <a:spcBef>
                 <a:spcPts val="0"/>
               </a:spcBef>
@@ -5381,7 +5694,7 @@
             </a:r>
           </a:p>
           <a:p>
-            <a:pPr indent="-228600" lvl="2" marL="1371600">
+            <a:pPr marL="1371600" lvl="2" indent="-228600">
               <a:spcBef>
                 <a:spcPts val="0"/>
               </a:spcBef>
@@ -5402,11 +5715,11 @@
 </file>
 
 <file path=ppt/slides/slide5.xml><?xml version="1.0" encoding="utf-8"?>
-<p:sld xmlns:a="http://schemas.openxmlformats.org/drawingml/2006/main" xmlns:r="http://schemas.openxmlformats.org/officeDocument/2006/relationships" xmlns:mc="http://schemas.openxmlformats.org/markup-compatibility/2006" xmlns:mv="urn:schemas-microsoft-com:mac:vml" xmlns:p="http://schemas.openxmlformats.org/presentationml/2006/main" xmlns:c="http://schemas.openxmlformats.org/drawingml/2006/chart" xmlns:dgm="http://schemas.openxmlformats.org/drawingml/2006/diagram" xmlns:o="urn:schemas-microsoft-com:office:office" xmlns:v="urn:schemas-microsoft-com:vml" xmlns:pvml="urn:schemas-microsoft-com:office:powerpoint" xmlns:com="http://schemas.openxmlformats.org/drawingml/2006/compatibility" xmlns:p14="http://schemas.microsoft.com/office/powerpoint/2010/main">
+<p:sld xmlns:a="http://schemas.openxmlformats.org/drawingml/2006/main" xmlns:r="http://schemas.openxmlformats.org/officeDocument/2006/relationships" xmlns:p="http://schemas.openxmlformats.org/presentationml/2006/main">
   <p:cSld>
     <p:spTree>
       <p:nvGrpSpPr>
-        <p:cNvPr id="88" name="Shape 88"/>
+        <p:cNvPr id="1" name="Shape 88"/>
         <p:cNvGrpSpPr/>
         <p:nvPr/>
       </p:nvGrpSpPr>
@@ -5421,7 +5734,9 @@
       <p:sp>
         <p:nvSpPr>
           <p:cNvPr id="89" name="Shape 89"/>
-          <p:cNvSpPr txBox="1"/>
+          <p:cNvSpPr txBox="1">
+            <a:spLocks noGrp="1"/>
+          </p:cNvSpPr>
           <p:nvPr>
             <p:ph type="title"/>
           </p:nvPr>
@@ -5436,7 +5751,7 @@
           </a:prstGeom>
         </p:spPr>
         <p:txBody>
-          <a:bodyPr anchorCtr="0" anchor="b" bIns="91425" lIns="91425" rIns="91425" tIns="91425">
+          <a:bodyPr lIns="91425" tIns="91425" rIns="91425" bIns="91425" anchor="b" anchorCtr="0">
             <a:noAutofit/>
           </a:bodyPr>
           <a:lstStyle/>
@@ -5457,9 +5772,11 @@
       <p:sp>
         <p:nvSpPr>
           <p:cNvPr id="90" name="Shape 90"/>
-          <p:cNvSpPr txBox="1"/>
+          <p:cNvSpPr txBox="1">
+            <a:spLocks noGrp="1"/>
+          </p:cNvSpPr>
           <p:nvPr>
-            <p:ph idx="1" type="body"/>
+            <p:ph type="body" idx="1"/>
           </p:nvPr>
         </p:nvSpPr>
         <p:spPr>
@@ -5472,12 +5789,12 @@
           </a:prstGeom>
         </p:spPr>
         <p:txBody>
-          <a:bodyPr anchorCtr="0" anchor="t" bIns="91425" lIns="91425" rIns="91425" tIns="91425">
+          <a:bodyPr lIns="91425" tIns="91425" rIns="91425" bIns="91425" anchor="t" anchorCtr="0">
             <a:noAutofit/>
           </a:bodyPr>
           <a:lstStyle/>
           <a:p>
-            <a:pPr indent="-228600" lvl="0" marL="457200" rtl="0">
+            <a:pPr marL="457200" lvl="0" indent="-228600" rtl="0">
               <a:spcBef>
                 <a:spcPts val="0"/>
               </a:spcBef>
@@ -5488,7 +5805,7 @@
             </a:r>
           </a:p>
           <a:p>
-            <a:pPr indent="-228600" lvl="1" marL="914400" rtl="0">
+            <a:pPr marL="914400" lvl="1" indent="-228600" rtl="0">
               <a:spcBef>
                 <a:spcPts val="0"/>
               </a:spcBef>
@@ -5499,7 +5816,7 @@
             </a:r>
           </a:p>
           <a:p>
-            <a:pPr indent="-228600" lvl="0" marL="457200" rtl="0">
+            <a:pPr marL="457200" lvl="0" indent="-228600" rtl="0">
               <a:spcBef>
                 <a:spcPts val="0"/>
               </a:spcBef>
@@ -5510,7 +5827,7 @@
             </a:r>
           </a:p>
           <a:p>
-            <a:pPr indent="-228600" lvl="1" marL="914400" rtl="0">
+            <a:pPr marL="914400" lvl="1" indent="-228600" rtl="0">
               <a:spcBef>
                 <a:spcPts val="0"/>
               </a:spcBef>
@@ -5521,7 +5838,7 @@
             </a:r>
           </a:p>
           <a:p>
-            <a:pPr indent="-228600" lvl="1" marL="914400">
+            <a:pPr marL="914400" lvl="1" indent="-228600">
               <a:spcBef>
                 <a:spcPts val="0"/>
               </a:spcBef>
@@ -5542,7 +5859,288 @@
 </file>
 
 <file path=ppt/theme/theme1.xml><?xml version="1.0" encoding="utf-8"?>
-<a:theme xmlns:a="http://schemas.openxmlformats.org/drawingml/2006/main" xmlns:r="http://schemas.openxmlformats.org/officeDocument/2006/relationships" name="Custom Theme">
+<a:theme xmlns:a="http://schemas.openxmlformats.org/drawingml/2006/main" name="marina">
+  <a:themeElements>
+    <a:clrScheme name="Marina">
+      <a:dk1>
+        <a:srgbClr val="FFFFFF"/>
+      </a:dk1>
+      <a:lt1>
+        <a:srgbClr val="00517C"/>
+      </a:lt1>
+      <a:dk2>
+        <a:srgbClr val="004065"/>
+      </a:dk2>
+      <a:lt2>
+        <a:srgbClr val="CFD8DC"/>
+      </a:lt2>
+      <a:accent1>
+        <a:srgbClr val="0277BD"/>
+      </a:accent1>
+      <a:accent2>
+        <a:srgbClr val="558B2F"/>
+      </a:accent2>
+      <a:accent3>
+        <a:srgbClr val="009688"/>
+      </a:accent3>
+      <a:accent4>
+        <a:srgbClr val="039BE5"/>
+      </a:accent4>
+      <a:accent5>
+        <a:srgbClr val="8BC34A"/>
+      </a:accent5>
+      <a:accent6>
+        <a:srgbClr val="FFEB38"/>
+      </a:accent6>
+      <a:hlink>
+        <a:srgbClr val="8BC34A"/>
+      </a:hlink>
+      <a:folHlink>
+        <a:srgbClr val="8BC34A"/>
+      </a:folHlink>
+    </a:clrScheme>
+    <a:fontScheme name="Office">
+      <a:majorFont>
+        <a:latin typeface="Arial"/>
+        <a:ea typeface=""/>
+        <a:cs typeface=""/>
+        <a:font script="Jpan" typeface="ＭＳ Ｐゴシック"/>
+        <a:font script="Hang" typeface="맑은 고딕"/>
+        <a:font script="Hans" typeface="宋体"/>
+        <a:font script="Hant" typeface="新細明體"/>
+        <a:font script="Arab" typeface="Times New Roman"/>
+        <a:font script="Hebr" typeface="Times New Roman"/>
+        <a:font script="Thai" typeface="Angsana New"/>
+        <a:font script="Ethi" typeface="Nyala"/>
+        <a:font script="Beng" typeface="Vrinda"/>
+        <a:font script="Gujr" typeface="Shruti"/>
+        <a:font script="Khmr" typeface="MoolBoran"/>
+        <a:font script="Knda" typeface="Tunga"/>
+        <a:font script="Guru" typeface="Raavi"/>
+        <a:font script="Cans" typeface="Euphemia"/>
+        <a:font script="Cher" typeface="Plantagenet Cherokee"/>
+        <a:font script="Yiii" typeface="Microsoft Yi Baiti"/>
+        <a:font script="Tibt" typeface="Microsoft Himalaya"/>
+        <a:font script="Thaa" typeface="MV Boli"/>
+        <a:font script="Deva" typeface="Mangal"/>
+        <a:font script="Telu" typeface="Gautami"/>
+        <a:font script="Taml" typeface="Latha"/>
+        <a:font script="Syrc" typeface="Estrangelo Edessa"/>
+        <a:font script="Orya" typeface="Kalinga"/>
+        <a:font script="Mlym" typeface="Kartika"/>
+        <a:font script="Laoo" typeface="DokChampa"/>
+        <a:font script="Sinh" typeface="Iskoola Pota"/>
+        <a:font script="Mong" typeface="Mongolian Baiti"/>
+        <a:font script="Viet" typeface="Times New Roman"/>
+        <a:font script="Uigh" typeface="Microsoft Uighur"/>
+        <a:font script="Geor" typeface="Sylfaen"/>
+      </a:majorFont>
+      <a:minorFont>
+        <a:latin typeface="Arial"/>
+        <a:ea typeface=""/>
+        <a:cs typeface=""/>
+        <a:font script="Jpan" typeface="ＭＳ Ｐゴシック"/>
+        <a:font script="Hang" typeface="맑은 고딕"/>
+        <a:font script="Hans" typeface="宋体"/>
+        <a:font script="Hant" typeface="新細明體"/>
+        <a:font script="Arab" typeface="Arial"/>
+        <a:font script="Hebr" typeface="Arial"/>
+        <a:font script="Thai" typeface="Cordia New"/>
+        <a:font script="Ethi" typeface="Nyala"/>
+        <a:font script="Beng" typeface="Vrinda"/>
+        <a:font script="Gujr" typeface="Shruti"/>
+        <a:font script="Khmr" typeface="DaunPenh"/>
+        <a:font script="Knda" typeface="Tunga"/>
+        <a:font script="Guru" typeface="Raavi"/>
+        <a:font script="Cans" typeface="Euphemia"/>
+        <a:font script="Cher" typeface="Plantagenet Cherokee"/>
+        <a:font script="Yiii" typeface="Microsoft Yi Baiti"/>
+        <a:font script="Tibt" typeface="Microsoft Himalaya"/>
+        <a:font script="Thaa" typeface="MV Boli"/>
+        <a:font script="Deva" typeface="Mangal"/>
+        <a:font script="Telu" typeface="Gautami"/>
+        <a:font script="Taml" typeface="Latha"/>
+        <a:font script="Syrc" typeface="Estrangelo Edessa"/>
+        <a:font script="Orya" typeface="Kalinga"/>
+        <a:font script="Mlym" typeface="Kartika"/>
+        <a:font script="Laoo" typeface="DokChampa"/>
+        <a:font script="Sinh" typeface="Iskoola Pota"/>
+        <a:font script="Mong" typeface="Mongolian Baiti"/>
+        <a:font script="Viet" typeface="Arial"/>
+        <a:font script="Uigh" typeface="Microsoft Uighur"/>
+        <a:font script="Geor" typeface="Sylfaen"/>
+      </a:minorFont>
+    </a:fontScheme>
+    <a:fmtScheme name="Office">
+      <a:fillStyleLst>
+        <a:solidFill>
+          <a:schemeClr val="phClr"/>
+        </a:solidFill>
+        <a:gradFill rotWithShape="1">
+          <a:gsLst>
+            <a:gs pos="0">
+              <a:schemeClr val="phClr">
+                <a:tint val="50000"/>
+                <a:satMod val="300000"/>
+              </a:schemeClr>
+            </a:gs>
+            <a:gs pos="35000">
+              <a:schemeClr val="phClr">
+                <a:tint val="37000"/>
+                <a:satMod val="300000"/>
+              </a:schemeClr>
+            </a:gs>
+            <a:gs pos="100000">
+              <a:schemeClr val="phClr">
+                <a:tint val="15000"/>
+                <a:satMod val="350000"/>
+              </a:schemeClr>
+            </a:gs>
+          </a:gsLst>
+          <a:lin ang="16200000" scaled="1"/>
+        </a:gradFill>
+        <a:gradFill rotWithShape="1">
+          <a:gsLst>
+            <a:gs pos="0">
+              <a:schemeClr val="phClr">
+                <a:tint val="100000"/>
+                <a:shade val="100000"/>
+                <a:satMod val="130000"/>
+              </a:schemeClr>
+            </a:gs>
+            <a:gs pos="100000">
+              <a:schemeClr val="phClr">
+                <a:tint val="50000"/>
+                <a:shade val="100000"/>
+                <a:satMod val="350000"/>
+              </a:schemeClr>
+            </a:gs>
+          </a:gsLst>
+          <a:lin ang="16200000" scaled="0"/>
+        </a:gradFill>
+      </a:fillStyleLst>
+      <a:lnStyleLst>
+        <a:ln w="9525" cap="flat" cmpd="sng" algn="ctr">
+          <a:solidFill>
+            <a:schemeClr val="phClr">
+              <a:shade val="95000"/>
+              <a:satMod val="105000"/>
+            </a:schemeClr>
+          </a:solidFill>
+          <a:prstDash val="solid"/>
+        </a:ln>
+        <a:ln w="25400" cap="flat" cmpd="sng" algn="ctr">
+          <a:solidFill>
+            <a:schemeClr val="phClr"/>
+          </a:solidFill>
+          <a:prstDash val="solid"/>
+        </a:ln>
+        <a:ln w="38100" cap="flat" cmpd="sng" algn="ctr">
+          <a:solidFill>
+            <a:schemeClr val="phClr"/>
+          </a:solidFill>
+          <a:prstDash val="solid"/>
+        </a:ln>
+      </a:lnStyleLst>
+      <a:effectStyleLst>
+        <a:effectStyle>
+          <a:effectLst>
+            <a:outerShdw blurRad="40000" dist="20000" dir="5400000" rotWithShape="0">
+              <a:srgbClr val="000000">
+                <a:alpha val="38000"/>
+              </a:srgbClr>
+            </a:outerShdw>
+          </a:effectLst>
+        </a:effectStyle>
+        <a:effectStyle>
+          <a:effectLst>
+            <a:outerShdw blurRad="40000" dist="23000" dir="5400000" rotWithShape="0">
+              <a:srgbClr val="000000">
+                <a:alpha val="35000"/>
+              </a:srgbClr>
+            </a:outerShdw>
+          </a:effectLst>
+        </a:effectStyle>
+        <a:effectStyle>
+          <a:effectLst>
+            <a:outerShdw blurRad="40000" dist="23000" dir="5400000" rotWithShape="0">
+              <a:srgbClr val="000000">
+                <a:alpha val="35000"/>
+              </a:srgbClr>
+            </a:outerShdw>
+          </a:effectLst>
+          <a:scene3d>
+            <a:camera prst="orthographicFront">
+              <a:rot lat="0" lon="0" rev="0"/>
+            </a:camera>
+            <a:lightRig rig="threePt" dir="t">
+              <a:rot lat="0" lon="0" rev="1200000"/>
+            </a:lightRig>
+          </a:scene3d>
+          <a:sp3d>
+            <a:bevelT w="63500" h="25400"/>
+          </a:sp3d>
+        </a:effectStyle>
+      </a:effectStyleLst>
+      <a:bgFillStyleLst>
+        <a:solidFill>
+          <a:schemeClr val="phClr"/>
+        </a:solidFill>
+        <a:gradFill rotWithShape="1">
+          <a:gsLst>
+            <a:gs pos="0">
+              <a:schemeClr val="phClr">
+                <a:tint val="40000"/>
+                <a:satMod val="350000"/>
+              </a:schemeClr>
+            </a:gs>
+            <a:gs pos="40000">
+              <a:schemeClr val="phClr">
+                <a:tint val="45000"/>
+                <a:shade val="99000"/>
+                <a:satMod val="350000"/>
+              </a:schemeClr>
+            </a:gs>
+            <a:gs pos="100000">
+              <a:schemeClr val="phClr">
+                <a:shade val="20000"/>
+                <a:satMod val="255000"/>
+              </a:schemeClr>
+            </a:gs>
+          </a:gsLst>
+          <a:path path="circle">
+            <a:fillToRect l="50000" t="-80000" r="50000" b="180000"/>
+          </a:path>
+        </a:gradFill>
+        <a:gradFill rotWithShape="1">
+          <a:gsLst>
+            <a:gs pos="0">
+              <a:schemeClr val="phClr">
+                <a:tint val="80000"/>
+                <a:satMod val="300000"/>
+              </a:schemeClr>
+            </a:gs>
+            <a:gs pos="100000">
+              <a:schemeClr val="phClr">
+                <a:shade val="30000"/>
+                <a:satMod val="200000"/>
+              </a:schemeClr>
+            </a:gs>
+          </a:gsLst>
+          <a:path path="circle">
+            <a:fillToRect l="50000" t="50000" r="50000" b="50000"/>
+          </a:path>
+        </a:gradFill>
+      </a:bgFillStyleLst>
+    </a:fmtScheme>
+  </a:themeElements>
+  <a:objectDefaults/>
+  <a:extraClrSchemeLst/>
+</a:theme>
+</file>
+
+<file path=ppt/theme/theme2.xml><?xml version="1.0" encoding="utf-8"?>
+<a:theme xmlns:a="http://schemas.openxmlformats.org/drawingml/2006/main" name="Custom Theme">
   <a:themeElements>
     <a:clrScheme name="Default">
       <a:dk1>
@@ -5817,284 +6415,7 @@
       </a:bgFillStyleLst>
     </a:fmtScheme>
   </a:themeElements>
-</a:theme>
-</file>
-
-<file path=ppt/theme/theme2.xml><?xml version="1.0" encoding="utf-8"?>
-<a:theme xmlns:a="http://schemas.openxmlformats.org/drawingml/2006/main" xmlns:r="http://schemas.openxmlformats.org/officeDocument/2006/relationships" name="marina">
-  <a:themeElements>
-    <a:clrScheme name="Marina">
-      <a:dk1>
-        <a:srgbClr val="FFFFFF"/>
-      </a:dk1>
-      <a:lt1>
-        <a:srgbClr val="00517C"/>
-      </a:lt1>
-      <a:dk2>
-        <a:srgbClr val="004065"/>
-      </a:dk2>
-      <a:lt2>
-        <a:srgbClr val="CFD8DC"/>
-      </a:lt2>
-      <a:accent1>
-        <a:srgbClr val="0277BD"/>
-      </a:accent1>
-      <a:accent2>
-        <a:srgbClr val="558B2F"/>
-      </a:accent2>
-      <a:accent3>
-        <a:srgbClr val="009688"/>
-      </a:accent3>
-      <a:accent4>
-        <a:srgbClr val="039BE5"/>
-      </a:accent4>
-      <a:accent5>
-        <a:srgbClr val="8BC34A"/>
-      </a:accent5>
-      <a:accent6>
-        <a:srgbClr val="FFEB38"/>
-      </a:accent6>
-      <a:hlink>
-        <a:srgbClr val="8BC34A"/>
-      </a:hlink>
-      <a:folHlink>
-        <a:srgbClr val="8BC34A"/>
-      </a:folHlink>
-    </a:clrScheme>
-    <a:fontScheme name="Office">
-      <a:majorFont>
-        <a:latin typeface="Arial"/>
-        <a:ea typeface=""/>
-        <a:cs typeface=""/>
-        <a:font script="Jpan" typeface="ＭＳ Ｐゴシック"/>
-        <a:font script="Hang" typeface="맑은 고딕"/>
-        <a:font script="Hans" typeface="宋体"/>
-        <a:font script="Hant" typeface="新細明體"/>
-        <a:font script="Arab" typeface="Times New Roman"/>
-        <a:font script="Hebr" typeface="Times New Roman"/>
-        <a:font script="Thai" typeface="Angsana New"/>
-        <a:font script="Ethi" typeface="Nyala"/>
-        <a:font script="Beng" typeface="Vrinda"/>
-        <a:font script="Gujr" typeface="Shruti"/>
-        <a:font script="Khmr" typeface="MoolBoran"/>
-        <a:font script="Knda" typeface="Tunga"/>
-        <a:font script="Guru" typeface="Raavi"/>
-        <a:font script="Cans" typeface="Euphemia"/>
-        <a:font script="Cher" typeface="Plantagenet Cherokee"/>
-        <a:font script="Yiii" typeface="Microsoft Yi Baiti"/>
-        <a:font script="Tibt" typeface="Microsoft Himalaya"/>
-        <a:font script="Thaa" typeface="MV Boli"/>
-        <a:font script="Deva" typeface="Mangal"/>
-        <a:font script="Telu" typeface="Gautami"/>
-        <a:font script="Taml" typeface="Latha"/>
-        <a:font script="Syrc" typeface="Estrangelo Edessa"/>
-        <a:font script="Orya" typeface="Kalinga"/>
-        <a:font script="Mlym" typeface="Kartika"/>
-        <a:font script="Laoo" typeface="DokChampa"/>
-        <a:font script="Sinh" typeface="Iskoola Pota"/>
-        <a:font script="Mong" typeface="Mongolian Baiti"/>
-        <a:font script="Viet" typeface="Times New Roman"/>
-        <a:font script="Uigh" typeface="Microsoft Uighur"/>
-        <a:font script="Geor" typeface="Sylfaen"/>
-      </a:majorFont>
-      <a:minorFont>
-        <a:latin typeface="Arial"/>
-        <a:ea typeface=""/>
-        <a:cs typeface=""/>
-        <a:font script="Jpan" typeface="ＭＳ Ｐゴシック"/>
-        <a:font script="Hang" typeface="맑은 고딕"/>
-        <a:font script="Hans" typeface="宋体"/>
-        <a:font script="Hant" typeface="新細明體"/>
-        <a:font script="Arab" typeface="Arial"/>
-        <a:font script="Hebr" typeface="Arial"/>
-        <a:font script="Thai" typeface="Cordia New"/>
-        <a:font script="Ethi" typeface="Nyala"/>
-        <a:font script="Beng" typeface="Vrinda"/>
-        <a:font script="Gujr" typeface="Shruti"/>
-        <a:font script="Khmr" typeface="DaunPenh"/>
-        <a:font script="Knda" typeface="Tunga"/>
-        <a:font script="Guru" typeface="Raavi"/>
-        <a:font script="Cans" typeface="Euphemia"/>
-        <a:font script="Cher" typeface="Plantagenet Cherokee"/>
-        <a:font script="Yiii" typeface="Microsoft Yi Baiti"/>
-        <a:font script="Tibt" typeface="Microsoft Himalaya"/>
-        <a:font script="Thaa" typeface="MV Boli"/>
-        <a:font script="Deva" typeface="Mangal"/>
-        <a:font script="Telu" typeface="Gautami"/>
-        <a:font script="Taml" typeface="Latha"/>
-        <a:font script="Syrc" typeface="Estrangelo Edessa"/>
-        <a:font script="Orya" typeface="Kalinga"/>
-        <a:font script="Mlym" typeface="Kartika"/>
-        <a:font script="Laoo" typeface="DokChampa"/>
-        <a:font script="Sinh" typeface="Iskoola Pota"/>
-        <a:font script="Mong" typeface="Mongolian Baiti"/>
-        <a:font script="Viet" typeface="Arial"/>
-        <a:font script="Uigh" typeface="Microsoft Uighur"/>
-        <a:font script="Geor" typeface="Sylfaen"/>
-      </a:minorFont>
-    </a:fontScheme>
-    <a:fmtScheme name="Office">
-      <a:fillStyleLst>
-        <a:solidFill>
-          <a:schemeClr val="phClr"/>
-        </a:solidFill>
-        <a:gradFill rotWithShape="1">
-          <a:gsLst>
-            <a:gs pos="0">
-              <a:schemeClr val="phClr">
-                <a:tint val="50000"/>
-                <a:satMod val="300000"/>
-              </a:schemeClr>
-            </a:gs>
-            <a:gs pos="35000">
-              <a:schemeClr val="phClr">
-                <a:tint val="37000"/>
-                <a:satMod val="300000"/>
-              </a:schemeClr>
-            </a:gs>
-            <a:gs pos="100000">
-              <a:schemeClr val="phClr">
-                <a:tint val="15000"/>
-                <a:satMod val="350000"/>
-              </a:schemeClr>
-            </a:gs>
-          </a:gsLst>
-          <a:lin ang="16200000" scaled="1"/>
-        </a:gradFill>
-        <a:gradFill rotWithShape="1">
-          <a:gsLst>
-            <a:gs pos="0">
-              <a:schemeClr val="phClr">
-                <a:tint val="100000"/>
-                <a:shade val="100000"/>
-                <a:satMod val="130000"/>
-              </a:schemeClr>
-            </a:gs>
-            <a:gs pos="100000">
-              <a:schemeClr val="phClr">
-                <a:tint val="50000"/>
-                <a:shade val="100000"/>
-                <a:satMod val="350000"/>
-              </a:schemeClr>
-            </a:gs>
-          </a:gsLst>
-          <a:lin ang="16200000" scaled="0"/>
-        </a:gradFill>
-      </a:fillStyleLst>
-      <a:lnStyleLst>
-        <a:ln w="9525" cap="flat" cmpd="sng" algn="ctr">
-          <a:solidFill>
-            <a:schemeClr val="phClr">
-              <a:shade val="95000"/>
-              <a:satMod val="105000"/>
-            </a:schemeClr>
-          </a:solidFill>
-          <a:prstDash val="solid"/>
-        </a:ln>
-        <a:ln w="25400" cap="flat" cmpd="sng" algn="ctr">
-          <a:solidFill>
-            <a:schemeClr val="phClr"/>
-          </a:solidFill>
-          <a:prstDash val="solid"/>
-        </a:ln>
-        <a:ln w="38100" cap="flat" cmpd="sng" algn="ctr">
-          <a:solidFill>
-            <a:schemeClr val="phClr"/>
-          </a:solidFill>
-          <a:prstDash val="solid"/>
-        </a:ln>
-      </a:lnStyleLst>
-      <a:effectStyleLst>
-        <a:effectStyle>
-          <a:effectLst>
-            <a:outerShdw blurRad="40000" dist="20000" dir="5400000" rotWithShape="0">
-              <a:srgbClr val="000000">
-                <a:alpha val="38000"/>
-              </a:srgbClr>
-            </a:outerShdw>
-          </a:effectLst>
-        </a:effectStyle>
-        <a:effectStyle>
-          <a:effectLst>
-            <a:outerShdw blurRad="40000" dist="23000" dir="5400000" rotWithShape="0">
-              <a:srgbClr val="000000">
-                <a:alpha val="35000"/>
-              </a:srgbClr>
-            </a:outerShdw>
-          </a:effectLst>
-        </a:effectStyle>
-        <a:effectStyle>
-          <a:effectLst>
-            <a:outerShdw blurRad="40000" dist="23000" dir="5400000" rotWithShape="0">
-              <a:srgbClr val="000000">
-                <a:alpha val="35000"/>
-              </a:srgbClr>
-            </a:outerShdw>
-          </a:effectLst>
-          <a:scene3d>
-            <a:camera prst="orthographicFront">
-              <a:rot lat="0" lon="0" rev="0"/>
-            </a:camera>
-            <a:lightRig rig="threePt" dir="t">
-              <a:rot lat="0" lon="0" rev="1200000"/>
-            </a:lightRig>
-          </a:scene3d>
-          <a:sp3d>
-            <a:bevelT w="63500" h="25400"/>
-          </a:sp3d>
-        </a:effectStyle>
-      </a:effectStyleLst>
-      <a:bgFillStyleLst>
-        <a:solidFill>
-          <a:schemeClr val="phClr"/>
-        </a:solidFill>
-        <a:gradFill rotWithShape="1">
-          <a:gsLst>
-            <a:gs pos="0">
-              <a:schemeClr val="phClr">
-                <a:tint val="40000"/>
-                <a:satMod val="350000"/>
-              </a:schemeClr>
-            </a:gs>
-            <a:gs pos="40000">
-              <a:schemeClr val="phClr">
-                <a:tint val="45000"/>
-                <a:shade val="99000"/>
-                <a:satMod val="350000"/>
-              </a:schemeClr>
-            </a:gs>
-            <a:gs pos="100000">
-              <a:schemeClr val="phClr">
-                <a:shade val="20000"/>
-                <a:satMod val="255000"/>
-              </a:schemeClr>
-            </a:gs>
-          </a:gsLst>
-          <a:path path="circle">
-            <a:fillToRect l="50000" t="-80000" r="50000" b="180000"/>
-          </a:path>
-        </a:gradFill>
-        <a:gradFill rotWithShape="1">
-          <a:gsLst>
-            <a:gs pos="0">
-              <a:schemeClr val="phClr">
-                <a:tint val="80000"/>
-                <a:satMod val="300000"/>
-              </a:schemeClr>
-            </a:gs>
-            <a:gs pos="100000">
-              <a:schemeClr val="phClr">
-                <a:shade val="30000"/>
-                <a:satMod val="200000"/>
-              </a:schemeClr>
-            </a:gs>
-          </a:gsLst>
-          <a:path path="circle">
-            <a:fillToRect l="50000" t="50000" r="50000" b="50000"/>
-          </a:path>
-        </a:gradFill>
-      </a:bgFillStyleLst>
-    </a:fmtScheme>
-  </a:themeElements>
+  <a:objectDefaults/>
+  <a:extraClrSchemeLst/>
 </a:theme>
 </file>
</xml_diff>